<commit_message>
changes to code architecture image
</commit_message>
<xml_diff>
--- a/docs/code_architecture.pptx
+++ b/docs/code_architecture.pptx
@@ -259,7 +259,7 @@
           <a:p>
             <a:fld id="{7E403C90-7864-4C40-A504-B46ABA4FB44B}" type="datetimeFigureOut">
               <a:rPr lang="en-US" smtClean="0"/>
-              <a:t>10/22/21</a:t>
+              <a:t>10/26/21</a:t>
             </a:fld>
             <a:endParaRPr lang="en-US"/>
           </a:p>
@@ -457,7 +457,7 @@
           <a:p>
             <a:fld id="{7E403C90-7864-4C40-A504-B46ABA4FB44B}" type="datetimeFigureOut">
               <a:rPr lang="en-US" smtClean="0"/>
-              <a:t>10/22/21</a:t>
+              <a:t>10/26/21</a:t>
             </a:fld>
             <a:endParaRPr lang="en-US"/>
           </a:p>
@@ -665,7 +665,7 @@
           <a:p>
             <a:fld id="{7E403C90-7864-4C40-A504-B46ABA4FB44B}" type="datetimeFigureOut">
               <a:rPr lang="en-US" smtClean="0"/>
-              <a:t>10/22/21</a:t>
+              <a:t>10/26/21</a:t>
             </a:fld>
             <a:endParaRPr lang="en-US"/>
           </a:p>
@@ -863,7 +863,7 @@
           <a:p>
             <a:fld id="{7E403C90-7864-4C40-A504-B46ABA4FB44B}" type="datetimeFigureOut">
               <a:rPr lang="en-US" smtClean="0"/>
-              <a:t>10/22/21</a:t>
+              <a:t>10/26/21</a:t>
             </a:fld>
             <a:endParaRPr lang="en-US"/>
           </a:p>
@@ -1138,7 +1138,7 @@
           <a:p>
             <a:fld id="{7E403C90-7864-4C40-A504-B46ABA4FB44B}" type="datetimeFigureOut">
               <a:rPr lang="en-US" smtClean="0"/>
-              <a:t>10/22/21</a:t>
+              <a:t>10/26/21</a:t>
             </a:fld>
             <a:endParaRPr lang="en-US"/>
           </a:p>
@@ -1403,7 +1403,7 @@
           <a:p>
             <a:fld id="{7E403C90-7864-4C40-A504-B46ABA4FB44B}" type="datetimeFigureOut">
               <a:rPr lang="en-US" smtClean="0"/>
-              <a:t>10/22/21</a:t>
+              <a:t>10/26/21</a:t>
             </a:fld>
             <a:endParaRPr lang="en-US"/>
           </a:p>
@@ -1815,7 +1815,7 @@
           <a:p>
             <a:fld id="{7E403C90-7864-4C40-A504-B46ABA4FB44B}" type="datetimeFigureOut">
               <a:rPr lang="en-US" smtClean="0"/>
-              <a:t>10/22/21</a:t>
+              <a:t>10/26/21</a:t>
             </a:fld>
             <a:endParaRPr lang="en-US"/>
           </a:p>
@@ -1956,7 +1956,7 @@
           <a:p>
             <a:fld id="{7E403C90-7864-4C40-A504-B46ABA4FB44B}" type="datetimeFigureOut">
               <a:rPr lang="en-US" smtClean="0"/>
-              <a:t>10/22/21</a:t>
+              <a:t>10/26/21</a:t>
             </a:fld>
             <a:endParaRPr lang="en-US"/>
           </a:p>
@@ -2069,7 +2069,7 @@
           <a:p>
             <a:fld id="{7E403C90-7864-4C40-A504-B46ABA4FB44B}" type="datetimeFigureOut">
               <a:rPr lang="en-US" smtClean="0"/>
-              <a:t>10/22/21</a:t>
+              <a:t>10/26/21</a:t>
             </a:fld>
             <a:endParaRPr lang="en-US"/>
           </a:p>
@@ -2380,7 +2380,7 @@
           <a:p>
             <a:fld id="{7E403C90-7864-4C40-A504-B46ABA4FB44B}" type="datetimeFigureOut">
               <a:rPr lang="en-US" smtClean="0"/>
-              <a:t>10/22/21</a:t>
+              <a:t>10/26/21</a:t>
             </a:fld>
             <a:endParaRPr lang="en-US"/>
           </a:p>
@@ -2668,7 +2668,7 @@
           <a:p>
             <a:fld id="{7E403C90-7864-4C40-A504-B46ABA4FB44B}" type="datetimeFigureOut">
               <a:rPr lang="en-US" smtClean="0"/>
-              <a:t>10/22/21</a:t>
+              <a:t>10/26/21</a:t>
             </a:fld>
             <a:endParaRPr lang="en-US"/>
           </a:p>
@@ -2909,7 +2909,7 @@
           <a:p>
             <a:fld id="{7E403C90-7864-4C40-A504-B46ABA4FB44B}" type="datetimeFigureOut">
               <a:rPr lang="en-US" smtClean="0"/>
-              <a:t>10/22/21</a:t>
+              <a:t>10/26/21</a:t>
             </a:fld>
             <a:endParaRPr lang="en-US"/>
           </a:p>
@@ -3749,7 +3749,7 @@
         </p:blipFill>
         <p:spPr bwMode="auto">
           <a:xfrm>
-            <a:off x="7550491" y="3859924"/>
+            <a:off x="7578157" y="3816054"/>
             <a:ext cx="1270000" cy="782551"/>
           </a:xfrm>
           <a:prstGeom prst="rect">
@@ -6479,7 +6479,7 @@
         </p:nvCxnSpPr>
         <p:spPr>
           <a:xfrm flipH="1">
-            <a:off x="6169572" y="4251200"/>
+            <a:off x="6197238" y="4207330"/>
             <a:ext cx="1380919" cy="0"/>
           </a:xfrm>
           <a:prstGeom prst="straightConnector1">
@@ -6811,8 +6811,8 @@
         </p:nvSpPr>
         <p:spPr>
           <a:xfrm>
-            <a:off x="9302652" y="4043363"/>
-            <a:ext cx="1424312" cy="461665"/>
+            <a:off x="8162722" y="4611264"/>
+            <a:ext cx="1642025" cy="461665"/>
           </a:xfrm>
           <a:prstGeom prst="rect">
             <a:avLst/>
@@ -6975,6 +6975,99 @@
                 <a:latin typeface=""/>
               </a:rPr>
               <a:t>Write back to NAS</a:t>
+            </a:r>
+          </a:p>
+        </p:txBody>
+      </p:sp>
+      <p:pic>
+        <p:nvPicPr>
+          <p:cNvPr id="2" name="Picture 2" descr="cellpose">
+            <a:extLst>
+              <a:ext uri="{FF2B5EF4-FFF2-40B4-BE49-F238E27FC236}">
+                <a16:creationId xmlns:a16="http://schemas.microsoft.com/office/drawing/2014/main" id="{A03EDA7E-F98B-9148-B5B3-65473F05471A}"/>
+              </a:ext>
+            </a:extLst>
+          </p:cNvPr>
+          <p:cNvPicPr>
+            <a:picLocks noChangeAspect="1" noChangeArrowheads="1"/>
+          </p:cNvPicPr>
+          <p:nvPr/>
+        </p:nvPicPr>
+        <p:blipFill>
+          <a:blip r:embed="rId24">
+            <a:extLst>
+              <a:ext uri="{28A0092B-C50C-407E-A947-70E740481C1C}">
+                <a14:useLocalDpi xmlns:a14="http://schemas.microsoft.com/office/drawing/2010/main" val="0"/>
+              </a:ext>
+            </a:extLst>
+          </a:blip>
+          <a:srcRect/>
+          <a:stretch>
+            <a:fillRect/>
+          </a:stretch>
+        </p:blipFill>
+        <p:spPr bwMode="auto">
+          <a:xfrm>
+            <a:off x="9441307" y="3627902"/>
+            <a:ext cx="584084" cy="584084"/>
+          </a:xfrm>
+          <a:prstGeom prst="rect">
+            <a:avLst/>
+          </a:prstGeom>
+          <a:noFill/>
+          <a:extLst>
+            <a:ext uri="{909E8E84-426E-40DD-AFC4-6F175D3DCCD1}">
+              <a14:hiddenFill xmlns:a14="http://schemas.microsoft.com/office/drawing/2010/main">
+                <a:solidFill>
+                  <a:srgbClr val="FFFFFF"/>
+                </a:solidFill>
+              </a14:hiddenFill>
+            </a:ext>
+          </a:extLst>
+        </p:spPr>
+      </p:pic>
+      <p:sp>
+        <p:nvSpPr>
+          <p:cNvPr id="92" name="TextBox 91">
+            <a:extLst>
+              <a:ext uri="{FF2B5EF4-FFF2-40B4-BE49-F238E27FC236}">
+                <a16:creationId xmlns:a16="http://schemas.microsoft.com/office/drawing/2014/main" id="{4A1983C6-CB47-5645-9734-52509C25019D}"/>
+              </a:ext>
+            </a:extLst>
+          </p:cNvPr>
+          <p:cNvSpPr txBox="1"/>
+          <p:nvPr/>
+        </p:nvSpPr>
+        <p:spPr>
+          <a:xfrm>
+            <a:off x="9138850" y="4202654"/>
+            <a:ext cx="1188997" cy="307777"/>
+          </a:xfrm>
+          <a:prstGeom prst="rect">
+            <a:avLst/>
+          </a:prstGeom>
+          <a:noFill/>
+        </p:spPr>
+        <p:txBody>
+          <a:bodyPr wrap="square">
+            <a:spAutoFit/>
+          </a:bodyPr>
+          <a:lstStyle/>
+          <a:p>
+            <a:pPr algn="ctr"/>
+            <a:r>
+              <a:rPr lang="en-US" sz="1400" b="1" dirty="0">
+                <a:solidFill>
+                  <a:schemeClr val="tx1">
+                    <a:lumMod val="75000"/>
+                    <a:lumOff val="25000"/>
+                  </a:schemeClr>
+                </a:solidFill>
+                <a:latin typeface="Menlo" panose="020B0609030804020204" pitchFamily="49" charset="0"/>
+                <a:ea typeface="Menlo" panose="020B0609030804020204" pitchFamily="49" charset="0"/>
+                <a:cs typeface="Menlo" panose="020B0609030804020204" pitchFamily="49" charset="0"/>
+              </a:rPr>
+              <a:t>Cellpose</a:t>
             </a:r>
           </a:p>
         </p:txBody>

</xml_diff>

<commit_message>
modification to code archtecture
</commit_message>
<xml_diff>
--- a/docs/code_architecture.pptx
+++ b/docs/code_architecture.pptx
@@ -5,7 +5,7 @@
     <p:sldMasterId id="2147483648" r:id="rId1"/>
   </p:sldMasterIdLst>
   <p:sldIdLst>
-    <p:sldId id="257" r:id="rId2"/>
+    <p:sldId id="258" r:id="rId2"/>
   </p:sldIdLst>
   <p:sldSz cx="12192000" cy="6858000"/>
   <p:notesSz cx="6858000" cy="9144000"/>
@@ -259,7 +259,7 @@
           <a:p>
             <a:fld id="{7E403C90-7864-4C40-A504-B46ABA4FB44B}" type="datetimeFigureOut">
               <a:rPr lang="en-US" smtClean="0"/>
-              <a:t>11/9/21</a:t>
+              <a:t>12/16/21</a:t>
             </a:fld>
             <a:endParaRPr lang="en-US"/>
           </a:p>
@@ -457,7 +457,7 @@
           <a:p>
             <a:fld id="{7E403C90-7864-4C40-A504-B46ABA4FB44B}" type="datetimeFigureOut">
               <a:rPr lang="en-US" smtClean="0"/>
-              <a:t>11/9/21</a:t>
+              <a:t>12/16/21</a:t>
             </a:fld>
             <a:endParaRPr lang="en-US"/>
           </a:p>
@@ -665,7 +665,7 @@
           <a:p>
             <a:fld id="{7E403C90-7864-4C40-A504-B46ABA4FB44B}" type="datetimeFigureOut">
               <a:rPr lang="en-US" smtClean="0"/>
-              <a:t>11/9/21</a:t>
+              <a:t>12/16/21</a:t>
             </a:fld>
             <a:endParaRPr lang="en-US"/>
           </a:p>
@@ -863,7 +863,7 @@
           <a:p>
             <a:fld id="{7E403C90-7864-4C40-A504-B46ABA4FB44B}" type="datetimeFigureOut">
               <a:rPr lang="en-US" smtClean="0"/>
-              <a:t>11/9/21</a:t>
+              <a:t>12/16/21</a:t>
             </a:fld>
             <a:endParaRPr lang="en-US"/>
           </a:p>
@@ -1138,7 +1138,7 @@
           <a:p>
             <a:fld id="{7E403C90-7864-4C40-A504-B46ABA4FB44B}" type="datetimeFigureOut">
               <a:rPr lang="en-US" smtClean="0"/>
-              <a:t>11/9/21</a:t>
+              <a:t>12/16/21</a:t>
             </a:fld>
             <a:endParaRPr lang="en-US"/>
           </a:p>
@@ -1403,7 +1403,7 @@
           <a:p>
             <a:fld id="{7E403C90-7864-4C40-A504-B46ABA4FB44B}" type="datetimeFigureOut">
               <a:rPr lang="en-US" smtClean="0"/>
-              <a:t>11/9/21</a:t>
+              <a:t>12/16/21</a:t>
             </a:fld>
             <a:endParaRPr lang="en-US"/>
           </a:p>
@@ -1815,7 +1815,7 @@
           <a:p>
             <a:fld id="{7E403C90-7864-4C40-A504-B46ABA4FB44B}" type="datetimeFigureOut">
               <a:rPr lang="en-US" smtClean="0"/>
-              <a:t>11/9/21</a:t>
+              <a:t>12/16/21</a:t>
             </a:fld>
             <a:endParaRPr lang="en-US"/>
           </a:p>
@@ -1956,7 +1956,7 @@
           <a:p>
             <a:fld id="{7E403C90-7864-4C40-A504-B46ABA4FB44B}" type="datetimeFigureOut">
               <a:rPr lang="en-US" smtClean="0"/>
-              <a:t>11/9/21</a:t>
+              <a:t>12/16/21</a:t>
             </a:fld>
             <a:endParaRPr lang="en-US"/>
           </a:p>
@@ -2069,7 +2069,7 @@
           <a:p>
             <a:fld id="{7E403C90-7864-4C40-A504-B46ABA4FB44B}" type="datetimeFigureOut">
               <a:rPr lang="en-US" smtClean="0"/>
-              <a:t>11/9/21</a:t>
+              <a:t>12/16/21</a:t>
             </a:fld>
             <a:endParaRPr lang="en-US"/>
           </a:p>
@@ -2380,7 +2380,7 @@
           <a:p>
             <a:fld id="{7E403C90-7864-4C40-A504-B46ABA4FB44B}" type="datetimeFigureOut">
               <a:rPr lang="en-US" smtClean="0"/>
-              <a:t>11/9/21</a:t>
+              <a:t>12/16/21</a:t>
             </a:fld>
             <a:endParaRPr lang="en-US"/>
           </a:p>
@@ -2668,7 +2668,7 @@
           <a:p>
             <a:fld id="{7E403C90-7864-4C40-A504-B46ABA4FB44B}" type="datetimeFigureOut">
               <a:rPr lang="en-US" smtClean="0"/>
-              <a:t>11/9/21</a:t>
+              <a:t>12/16/21</a:t>
             </a:fld>
             <a:endParaRPr lang="en-US"/>
           </a:p>
@@ -2909,7 +2909,7 @@
           <a:p>
             <a:fld id="{7E403C90-7864-4C40-A504-B46ABA4FB44B}" type="datetimeFigureOut">
               <a:rPr lang="en-US" smtClean="0"/>
-              <a:t>11/9/21</a:t>
+              <a:t>12/16/21</a:t>
             </a:fld>
             <a:endParaRPr lang="en-US"/>
           </a:p>
@@ -3328,16 +3328,16 @@
       </p:grpSpPr>
       <p:cxnSp>
         <p:nvCxnSpPr>
-          <p:cNvPr id="36" name="Straight Arrow Connector 35">
-            <a:extLst>
-              <a:ext uri="{FF2B5EF4-FFF2-40B4-BE49-F238E27FC236}">
-                <a16:creationId xmlns:a16="http://schemas.microsoft.com/office/drawing/2014/main" id="{02B34326-1E36-704A-941B-8B359C2C789D}"/>
+          <p:cNvPr id="2" name="Straight Arrow Connector 1">
+            <a:extLst>
+              <a:ext uri="{FF2B5EF4-FFF2-40B4-BE49-F238E27FC236}">
+                <a16:creationId xmlns:a16="http://schemas.microsoft.com/office/drawing/2014/main" id="{6E965BC4-4C43-2B46-B58C-5B7E050304E1}"/>
               </a:ext>
             </a:extLst>
           </p:cNvPr>
           <p:cNvCxnSpPr>
             <a:cxnSpLocks/>
-            <a:stCxn id="3" idx="3"/>
+            <a:stCxn id="9" idx="3"/>
           </p:cNvCxnSpPr>
           <p:nvPr/>
         </p:nvCxnSpPr>
@@ -3377,10 +3377,10 @@
       </p:cxnSp>
       <p:sp>
         <p:nvSpPr>
-          <p:cNvPr id="44" name="TextBox 43">
-            <a:extLst>
-              <a:ext uri="{FF2B5EF4-FFF2-40B4-BE49-F238E27FC236}">
-                <a16:creationId xmlns:a16="http://schemas.microsoft.com/office/drawing/2014/main" id="{0DE5C5DA-581D-4F4A-9E71-0905220C0E11}"/>
+          <p:cNvPr id="3" name="TextBox 2">
+            <a:extLst>
+              <a:ext uri="{FF2B5EF4-FFF2-40B4-BE49-F238E27FC236}">
+                <a16:creationId xmlns:a16="http://schemas.microsoft.com/office/drawing/2014/main" id="{67535C11-978A-EF49-BFA9-865AB2102AAF}"/>
               </a:ext>
             </a:extLst>
           </p:cNvPr>
@@ -3430,10 +3430,10 @@
       </p:sp>
       <p:sp>
         <p:nvSpPr>
-          <p:cNvPr id="45" name="TextBox 44">
-            <a:extLst>
-              <a:ext uri="{FF2B5EF4-FFF2-40B4-BE49-F238E27FC236}">
-                <a16:creationId xmlns:a16="http://schemas.microsoft.com/office/drawing/2014/main" id="{A3A09251-8680-6742-8EFA-6072EDB46B80}"/>
+          <p:cNvPr id="4" name="TextBox 3">
+            <a:extLst>
+              <a:ext uri="{FF2B5EF4-FFF2-40B4-BE49-F238E27FC236}">
+                <a16:creationId xmlns:a16="http://schemas.microsoft.com/office/drawing/2014/main" id="{C3CC080A-5475-694A-9AB9-64247F985BAB}"/>
               </a:ext>
             </a:extLst>
           </p:cNvPr>
@@ -3471,10 +3471,10 @@
       </p:sp>
       <p:cxnSp>
         <p:nvCxnSpPr>
-          <p:cNvPr id="47" name="Straight Arrow Connector 46">
-            <a:extLst>
-              <a:ext uri="{FF2B5EF4-FFF2-40B4-BE49-F238E27FC236}">
-                <a16:creationId xmlns:a16="http://schemas.microsoft.com/office/drawing/2014/main" id="{CD4978A2-D3D5-D044-97D6-4E632CA01C12}"/>
+          <p:cNvPr id="5" name="Straight Arrow Connector 4">
+            <a:extLst>
+              <a:ext uri="{FF2B5EF4-FFF2-40B4-BE49-F238E27FC236}">
+                <a16:creationId xmlns:a16="http://schemas.microsoft.com/office/drawing/2014/main" id="{EC255618-E4AC-BB49-9FAE-FBCCA16D1F98}"/>
               </a:ext>
             </a:extLst>
           </p:cNvPr>
@@ -3485,7 +3485,7 @@
         </p:nvCxnSpPr>
         <p:spPr>
           <a:xfrm flipH="1">
-            <a:off x="6281237" y="1952286"/>
+            <a:off x="6589847" y="1952286"/>
             <a:ext cx="2200611" cy="0"/>
           </a:xfrm>
           <a:prstGeom prst="straightConnector1">
@@ -3519,10 +3519,10 @@
       </p:cxnSp>
       <p:sp>
         <p:nvSpPr>
-          <p:cNvPr id="77" name="TextBox 76">
-            <a:extLst>
-              <a:ext uri="{FF2B5EF4-FFF2-40B4-BE49-F238E27FC236}">
-                <a16:creationId xmlns:a16="http://schemas.microsoft.com/office/drawing/2014/main" id="{52FAAC8D-CEA8-9F49-974D-F58D96A67262}"/>
+          <p:cNvPr id="6" name="TextBox 5">
+            <a:extLst>
+              <a:ext uri="{FF2B5EF4-FFF2-40B4-BE49-F238E27FC236}">
+                <a16:creationId xmlns:a16="http://schemas.microsoft.com/office/drawing/2014/main" id="{8B50D989-4C19-4F46-B3C6-3321B50CB008}"/>
               </a:ext>
             </a:extLst>
           </p:cNvPr>
@@ -3531,7 +3531,7 @@
         </p:nvSpPr>
         <p:spPr>
           <a:xfrm>
-            <a:off x="8358291" y="2570646"/>
+            <a:off x="8920089" y="2547947"/>
             <a:ext cx="1407758" cy="307777"/>
           </a:xfrm>
           <a:prstGeom prst="rect">
@@ -3560,10 +3560,10 @@
       </p:sp>
       <p:sp>
         <p:nvSpPr>
-          <p:cNvPr id="85" name="TextBox 84">
-            <a:extLst>
-              <a:ext uri="{FF2B5EF4-FFF2-40B4-BE49-F238E27FC236}">
-                <a16:creationId xmlns:a16="http://schemas.microsoft.com/office/drawing/2014/main" id="{74106C1B-3ED8-B149-9CC8-BDD6BFD7549F}"/>
+          <p:cNvPr id="7" name="TextBox 6">
+            <a:extLst>
+              <a:ext uri="{FF2B5EF4-FFF2-40B4-BE49-F238E27FC236}">
+                <a16:creationId xmlns:a16="http://schemas.microsoft.com/office/drawing/2014/main" id="{343BDA1D-E751-0847-9154-D9844E3E321C}"/>
               </a:ext>
             </a:extLst>
           </p:cNvPr>
@@ -3573,7 +3573,7 @@
         <p:spPr>
           <a:xfrm>
             <a:off x="285135" y="393290"/>
-            <a:ext cx="1858907" cy="369332"/>
+            <a:ext cx="3863558" cy="523220"/>
           </a:xfrm>
           <a:prstGeom prst="rect">
             <a:avLst/>
@@ -3587,7 +3587,11 @@
           <a:lstStyle/>
           <a:p>
             <a:r>
-              <a:rPr lang="en-US" dirty="0"/>
+              <a:rPr lang="en-US" sz="2800" dirty="0">
+                <a:latin typeface="Menlo" panose="020B0609030804020204" pitchFamily="49" charset="0"/>
+                <a:ea typeface="Menlo" panose="020B0609030804020204" pitchFamily="49" charset="0"/>
+                <a:cs typeface="Menlo" panose="020B0609030804020204" pitchFamily="49" charset="0"/>
+              </a:rPr>
               <a:t>Code architecture</a:t>
             </a:r>
           </a:p>
@@ -3595,10 +3599,10 @@
       </p:sp>
       <p:grpSp>
         <p:nvGrpSpPr>
-          <p:cNvPr id="1027" name="Group 1026">
-            <a:extLst>
-              <a:ext uri="{FF2B5EF4-FFF2-40B4-BE49-F238E27FC236}">
-                <a16:creationId xmlns:a16="http://schemas.microsoft.com/office/drawing/2014/main" id="{528BC522-7DA2-5345-A385-9848FE41DB59}"/>
+          <p:cNvPr id="8" name="Group 7">
+            <a:extLst>
+              <a:ext uri="{FF2B5EF4-FFF2-40B4-BE49-F238E27FC236}">
+                <a16:creationId xmlns:a16="http://schemas.microsoft.com/office/drawing/2014/main" id="{F6788599-EC96-C649-A3B1-709DA960B8F4}"/>
               </a:ext>
             </a:extLst>
           </p:cNvPr>
@@ -3615,10 +3619,10 @@
         </p:grpSpPr>
         <p:pic>
           <p:nvPicPr>
-            <p:cNvPr id="3" name="Graphic 2" descr="Microscope with solid fill">
+            <p:cNvPr id="9" name="Graphic 8" descr="Microscope with solid fill">
               <a:extLst>
                 <a:ext uri="{FF2B5EF4-FFF2-40B4-BE49-F238E27FC236}">
-                  <a16:creationId xmlns:a16="http://schemas.microsoft.com/office/drawing/2014/main" id="{42D68E07-3BD2-EA4C-A00C-581106CF1A93}"/>
+                  <a16:creationId xmlns:a16="http://schemas.microsoft.com/office/drawing/2014/main" id="{46D6D1FF-CE84-384B-99C7-AA140A1AFE9D}"/>
                 </a:ext>
               </a:extLst>
             </p:cNvPr>
@@ -3651,10 +3655,10 @@
         </p:pic>
         <p:pic>
           <p:nvPicPr>
-            <p:cNvPr id="87" name="Graphic 86" descr="Scientist female with solid fill">
+            <p:cNvPr id="10" name="Graphic 9" descr="Scientist female with solid fill">
               <a:extLst>
                 <a:ext uri="{FF2B5EF4-FFF2-40B4-BE49-F238E27FC236}">
-                  <a16:creationId xmlns:a16="http://schemas.microsoft.com/office/drawing/2014/main" id="{F0E5AF04-3CB4-9540-BB98-B1BC50CB9929}"/>
+                  <a16:creationId xmlns:a16="http://schemas.microsoft.com/office/drawing/2014/main" id="{D086CE5E-AAFF-984D-9C34-4158446B013D}"/>
                 </a:ext>
               </a:extLst>
             </p:cNvPr>
@@ -3687,10 +3691,10 @@
         </p:pic>
         <p:pic>
           <p:nvPicPr>
-            <p:cNvPr id="89" name="Graphic 88" descr="Scientist male with solid fill">
+            <p:cNvPr id="11" name="Graphic 10" descr="Scientist male with solid fill">
               <a:extLst>
                 <a:ext uri="{FF2B5EF4-FFF2-40B4-BE49-F238E27FC236}">
-                  <a16:creationId xmlns:a16="http://schemas.microsoft.com/office/drawing/2014/main" id="{EF880D97-0282-2543-9F28-66D8BDB689A2}"/>
+                  <a16:creationId xmlns:a16="http://schemas.microsoft.com/office/drawing/2014/main" id="{620F6580-4DCE-2A45-B015-3AABA2631C09}"/>
                 </a:ext>
               </a:extLst>
             </p:cNvPr>
@@ -3724,10 +3728,10 @@
       </p:grpSp>
       <p:pic>
         <p:nvPicPr>
-          <p:cNvPr id="1026" name="Picture 2" descr="@fish-quant">
-            <a:extLst>
-              <a:ext uri="{FF2B5EF4-FFF2-40B4-BE49-F238E27FC236}">
-                <a16:creationId xmlns:a16="http://schemas.microsoft.com/office/drawing/2014/main" id="{D98B1BF3-2306-7241-94F6-078BD5929BDA}"/>
+          <p:cNvPr id="12" name="Picture 2" descr="@fish-quant">
+            <a:extLst>
+              <a:ext uri="{FF2B5EF4-FFF2-40B4-BE49-F238E27FC236}">
+                <a16:creationId xmlns:a16="http://schemas.microsoft.com/office/drawing/2014/main" id="{33323416-E7F3-8B45-862E-18742793418A}"/>
               </a:ext>
             </a:extLst>
           </p:cNvPr>
@@ -3749,7 +3753,7 @@
         </p:blipFill>
         <p:spPr bwMode="auto">
           <a:xfrm>
-            <a:off x="7578157" y="3816054"/>
+            <a:off x="7576343" y="3591382"/>
             <a:ext cx="1270000" cy="782551"/>
           </a:xfrm>
           <a:prstGeom prst="rect">
@@ -3769,10 +3773,10 @@
       </p:pic>
       <p:sp>
         <p:nvSpPr>
-          <p:cNvPr id="94" name="TextBox 93">
-            <a:extLst>
-              <a:ext uri="{FF2B5EF4-FFF2-40B4-BE49-F238E27FC236}">
-                <a16:creationId xmlns:a16="http://schemas.microsoft.com/office/drawing/2014/main" id="{66B6D0A3-1587-D148-BB36-DC7B0832BA13}"/>
+          <p:cNvPr id="13" name="TextBox 12">
+            <a:extLst>
+              <a:ext uri="{FF2B5EF4-FFF2-40B4-BE49-F238E27FC236}">
+                <a16:creationId xmlns:a16="http://schemas.microsoft.com/office/drawing/2014/main" id="{50D7C286-EE68-3646-94E8-52BF8E62E995}"/>
               </a:ext>
             </a:extLst>
           </p:cNvPr>
@@ -3781,8 +3785,8 @@
         </p:nvSpPr>
         <p:spPr>
           <a:xfrm>
-            <a:off x="7463127" y="5115572"/>
-            <a:ext cx="3041217" cy="523220"/>
+            <a:off x="7919515" y="4796974"/>
+            <a:ext cx="3329759" cy="523220"/>
           </a:xfrm>
           <a:prstGeom prst="rect">
             <a:avLst/>
@@ -3815,17 +3819,17 @@
                 </a:solidFill>
                 <a:latin typeface=""/>
               </a:rPr>
-              <a:t>spot quantification and classification</a:t>
+              <a:t>3D-spot quantification and classification</a:t>
             </a:r>
           </a:p>
         </p:txBody>
       </p:sp>
       <p:grpSp>
         <p:nvGrpSpPr>
-          <p:cNvPr id="1051" name="Group 1050">
-            <a:extLst>
-              <a:ext uri="{FF2B5EF4-FFF2-40B4-BE49-F238E27FC236}">
-                <a16:creationId xmlns:a16="http://schemas.microsoft.com/office/drawing/2014/main" id="{B0CA1B80-C140-B846-A2B2-741A98A27EC3}"/>
+          <p:cNvPr id="14" name="Group 13">
+            <a:extLst>
+              <a:ext uri="{FF2B5EF4-FFF2-40B4-BE49-F238E27FC236}">
+                <a16:creationId xmlns:a16="http://schemas.microsoft.com/office/drawing/2014/main" id="{08A8199F-91E8-6E40-A663-81EEBC41F3F4}"/>
               </a:ext>
             </a:extLst>
           </p:cNvPr>
@@ -3834,7 +3838,7 @@
         </p:nvGrpSpPr>
         <p:grpSpPr>
           <a:xfrm>
-            <a:off x="8669995" y="1560089"/>
+            <a:off x="9271144" y="1600184"/>
             <a:ext cx="914400" cy="914400"/>
             <a:chOff x="9573885" y="1129165"/>
             <a:chExt cx="914400" cy="914400"/>
@@ -3842,10 +3846,10 @@
         </p:grpSpPr>
         <p:pic>
           <p:nvPicPr>
-            <p:cNvPr id="9" name="Graphic 8" descr="Laptop with solid fill">
+            <p:cNvPr id="15" name="Graphic 14" descr="Laptop with solid fill">
               <a:extLst>
                 <a:ext uri="{FF2B5EF4-FFF2-40B4-BE49-F238E27FC236}">
-                  <a16:creationId xmlns:a16="http://schemas.microsoft.com/office/drawing/2014/main" id="{43EF1B2B-C47B-CB4C-B900-A72DB584423C}"/>
+                  <a16:creationId xmlns:a16="http://schemas.microsoft.com/office/drawing/2014/main" id="{BE3697E6-889B-564F-939F-0632145FAD45}"/>
                 </a:ext>
               </a:extLst>
             </p:cNvPr>
@@ -3878,10 +3882,10 @@
         </p:pic>
         <p:pic>
           <p:nvPicPr>
-            <p:cNvPr id="1028" name="Picture 4">
+            <p:cNvPr id="16" name="Picture 4">
               <a:extLst>
                 <a:ext uri="{FF2B5EF4-FFF2-40B4-BE49-F238E27FC236}">
-                  <a16:creationId xmlns:a16="http://schemas.microsoft.com/office/drawing/2014/main" id="{49EF99F3-1840-C543-811A-6DC1CE593EE7}"/>
+                  <a16:creationId xmlns:a16="http://schemas.microsoft.com/office/drawing/2014/main" id="{1AF89B1F-2592-B84A-9E86-48B3274A8D7D}"/>
                 </a:ext>
               </a:extLst>
             </p:cNvPr>
@@ -3926,10 +3930,10 @@
       </p:grpSp>
       <p:grpSp>
         <p:nvGrpSpPr>
-          <p:cNvPr id="1029" name="Group 1028">
-            <a:extLst>
-              <a:ext uri="{FF2B5EF4-FFF2-40B4-BE49-F238E27FC236}">
-                <a16:creationId xmlns:a16="http://schemas.microsoft.com/office/drawing/2014/main" id="{694E9440-EC89-8642-9FCD-8DA846FAC79E}"/>
+          <p:cNvPr id="17" name="Group 16">
+            <a:extLst>
+              <a:ext uri="{FF2B5EF4-FFF2-40B4-BE49-F238E27FC236}">
+                <a16:creationId xmlns:a16="http://schemas.microsoft.com/office/drawing/2014/main" id="{53B2F883-F6F3-DA4D-8980-0539110B640F}"/>
               </a:ext>
             </a:extLst>
           </p:cNvPr>
@@ -3946,10 +3950,10 @@
         </p:grpSpPr>
         <p:pic>
           <p:nvPicPr>
-            <p:cNvPr id="5" name="Graphic 4" descr="Database with solid fill">
+            <p:cNvPr id="18" name="Graphic 17" descr="Database with solid fill">
               <a:extLst>
                 <a:ext uri="{FF2B5EF4-FFF2-40B4-BE49-F238E27FC236}">
-                  <a16:creationId xmlns:a16="http://schemas.microsoft.com/office/drawing/2014/main" id="{D35E5C98-F788-FE42-9E74-79807DBD4937}"/>
+                  <a16:creationId xmlns:a16="http://schemas.microsoft.com/office/drawing/2014/main" id="{7E49E9E2-4118-7040-8665-3D57234320FA}"/>
                 </a:ext>
               </a:extLst>
             </p:cNvPr>
@@ -3982,10 +3986,10 @@
         </p:pic>
         <p:grpSp>
           <p:nvGrpSpPr>
-            <p:cNvPr id="34" name="Group 33">
+            <p:cNvPr id="19" name="Group 18">
               <a:extLst>
                 <a:ext uri="{FF2B5EF4-FFF2-40B4-BE49-F238E27FC236}">
-                  <a16:creationId xmlns:a16="http://schemas.microsoft.com/office/drawing/2014/main" id="{AD08FD9B-6830-0C40-B0D8-74071D288D1B}"/>
+                  <a16:creationId xmlns:a16="http://schemas.microsoft.com/office/drawing/2014/main" id="{F3EA2418-507B-4648-9F3B-2C4160C4A438}"/>
                 </a:ext>
               </a:extLst>
             </p:cNvPr>
@@ -4004,10 +4008,10 @@
           </p:grpSpPr>
           <p:grpSp>
             <p:nvGrpSpPr>
-              <p:cNvPr id="10" name="Group 9">
+              <p:cNvPr id="50" name="Group 49">
                 <a:extLst>
                   <a:ext uri="{FF2B5EF4-FFF2-40B4-BE49-F238E27FC236}">
-                    <a16:creationId xmlns:a16="http://schemas.microsoft.com/office/drawing/2014/main" id="{63D9443A-1911-5D4C-B89A-F354F42D204F}"/>
+                    <a16:creationId xmlns:a16="http://schemas.microsoft.com/office/drawing/2014/main" id="{0D6AFEAD-92EB-CF4B-AA4B-1885472DA447}"/>
                   </a:ext>
                 </a:extLst>
               </p:cNvPr>
@@ -4031,10 +4035,10 @@
             </p:grpSpPr>
             <p:sp>
               <p:nvSpPr>
-                <p:cNvPr id="11" name="Rectangle 10">
+                <p:cNvPr id="67" name="Rectangle 66">
                   <a:extLst>
                     <a:ext uri="{FF2B5EF4-FFF2-40B4-BE49-F238E27FC236}">
-                      <a16:creationId xmlns:a16="http://schemas.microsoft.com/office/drawing/2014/main" id="{80B38FD1-1422-384F-B654-B2BCBD0CC26E}"/>
+                      <a16:creationId xmlns:a16="http://schemas.microsoft.com/office/drawing/2014/main" id="{84A4C332-709E-1843-A1FD-AB4C5756C2EE}"/>
                     </a:ext>
                   </a:extLst>
                 </p:cNvPr>
@@ -4085,10 +4089,10 @@
             </p:sp>
             <p:grpSp>
               <p:nvGrpSpPr>
-                <p:cNvPr id="12" name="Group 11">
+                <p:cNvPr id="68" name="Group 67">
                   <a:extLst>
                     <a:ext uri="{FF2B5EF4-FFF2-40B4-BE49-F238E27FC236}">
-                      <a16:creationId xmlns:a16="http://schemas.microsoft.com/office/drawing/2014/main" id="{66A1DBD4-C305-F843-8C7E-9E9E18C8D63B}"/>
+                      <a16:creationId xmlns:a16="http://schemas.microsoft.com/office/drawing/2014/main" id="{55E7907B-C7AA-9D44-AB41-32BF5314BAC7}"/>
                     </a:ext>
                   </a:extLst>
                 </p:cNvPr>
@@ -4107,10 +4111,10 @@
               </p:grpSpPr>
               <p:sp>
                 <p:nvSpPr>
-                  <p:cNvPr id="13" name="Oval 12">
+                  <p:cNvPr id="69" name="Oval 68">
                     <a:extLst>
                       <a:ext uri="{FF2B5EF4-FFF2-40B4-BE49-F238E27FC236}">
-                        <a16:creationId xmlns:a16="http://schemas.microsoft.com/office/drawing/2014/main" id="{3FE9D41D-5433-FF42-A1A7-51DDAD29E564}"/>
+                        <a16:creationId xmlns:a16="http://schemas.microsoft.com/office/drawing/2014/main" id="{7FAF14C4-8C88-B54E-82E0-B584B3B56957}"/>
                       </a:ext>
                     </a:extLst>
                   </p:cNvPr>
@@ -4164,10 +4168,10 @@
               </p:sp>
               <p:pic>
                 <p:nvPicPr>
-                  <p:cNvPr id="14" name="Graphic 13" descr="Mitochondria with solid fill">
+                  <p:cNvPr id="70" name="Graphic 69" descr="Mitochondria with solid fill">
                     <a:extLst>
                       <a:ext uri="{FF2B5EF4-FFF2-40B4-BE49-F238E27FC236}">
-                        <a16:creationId xmlns:a16="http://schemas.microsoft.com/office/drawing/2014/main" id="{2972D5E0-7B31-9D42-90EE-DDF443C3B27C}"/>
+                        <a16:creationId xmlns:a16="http://schemas.microsoft.com/office/drawing/2014/main" id="{E1AECCB5-9DDC-D641-BE7C-9B3CB1D22492}"/>
                       </a:ext>
                     </a:extLst>
                   </p:cNvPr>
@@ -4200,10 +4204,10 @@
               </p:pic>
               <p:grpSp>
                 <p:nvGrpSpPr>
-                  <p:cNvPr id="15" name="Group 14">
+                  <p:cNvPr id="71" name="Group 70">
                     <a:extLst>
                       <a:ext uri="{FF2B5EF4-FFF2-40B4-BE49-F238E27FC236}">
-                        <a16:creationId xmlns:a16="http://schemas.microsoft.com/office/drawing/2014/main" id="{52EADF9B-EB26-AF45-B5DB-664EC7B25C13}"/>
+                        <a16:creationId xmlns:a16="http://schemas.microsoft.com/office/drawing/2014/main" id="{84F1FE9B-BFB9-BF4B-9A4E-866BBBB4B040}"/>
                       </a:ext>
                     </a:extLst>
                   </p:cNvPr>
@@ -4220,10 +4224,10 @@
                 </p:grpSpPr>
                 <p:sp>
                   <p:nvSpPr>
-                    <p:cNvPr id="16" name="Rounded Rectangle 15">
+                    <p:cNvPr id="72" name="Rounded Rectangle 71">
                       <a:extLst>
                         <a:ext uri="{FF2B5EF4-FFF2-40B4-BE49-F238E27FC236}">
-                          <a16:creationId xmlns:a16="http://schemas.microsoft.com/office/drawing/2014/main" id="{E09B9446-7CE7-0449-ADD2-62AB8E68CE5D}"/>
+                          <a16:creationId xmlns:a16="http://schemas.microsoft.com/office/drawing/2014/main" id="{55893997-7E06-444F-9D9A-70710B540F33}"/>
                         </a:ext>
                       </a:extLst>
                     </p:cNvPr>
@@ -4277,10 +4281,10 @@
                 </p:sp>
                 <p:sp>
                   <p:nvSpPr>
-                    <p:cNvPr id="17" name="Oval 16">
+                    <p:cNvPr id="73" name="Oval 72">
                       <a:extLst>
                         <a:ext uri="{FF2B5EF4-FFF2-40B4-BE49-F238E27FC236}">
-                          <a16:creationId xmlns:a16="http://schemas.microsoft.com/office/drawing/2014/main" id="{A4644590-8DB2-054A-8D6A-6B4273108C5A}"/>
+                          <a16:creationId xmlns:a16="http://schemas.microsoft.com/office/drawing/2014/main" id="{A62AF2C2-D8CA-1749-80A1-61E3925E42FB}"/>
                         </a:ext>
                       </a:extLst>
                     </p:cNvPr>
@@ -4332,10 +4336,10 @@
           </p:grpSp>
           <p:grpSp>
             <p:nvGrpSpPr>
-              <p:cNvPr id="18" name="Group 17">
+              <p:cNvPr id="51" name="Group 50">
                 <a:extLst>
                   <a:ext uri="{FF2B5EF4-FFF2-40B4-BE49-F238E27FC236}">
-                    <a16:creationId xmlns:a16="http://schemas.microsoft.com/office/drawing/2014/main" id="{0A4D0D15-C81E-DD4A-B881-D33E704A8E74}"/>
+                    <a16:creationId xmlns:a16="http://schemas.microsoft.com/office/drawing/2014/main" id="{92AC6C5B-76B5-CB46-80CC-91CE3BA3F951}"/>
                   </a:ext>
                 </a:extLst>
               </p:cNvPr>
@@ -4359,10 +4363,10 @@
             </p:grpSpPr>
             <p:sp>
               <p:nvSpPr>
-                <p:cNvPr id="19" name="Rectangle 18">
+                <p:cNvPr id="60" name="Rectangle 59">
                   <a:extLst>
                     <a:ext uri="{FF2B5EF4-FFF2-40B4-BE49-F238E27FC236}">
-                      <a16:creationId xmlns:a16="http://schemas.microsoft.com/office/drawing/2014/main" id="{92EB5CB5-92EF-174D-8273-EC18F6B8631D}"/>
+                      <a16:creationId xmlns:a16="http://schemas.microsoft.com/office/drawing/2014/main" id="{D7677591-E15E-5540-87AD-1B37CF7F88D5}"/>
                     </a:ext>
                   </a:extLst>
                 </p:cNvPr>
@@ -4413,10 +4417,10 @@
             </p:sp>
             <p:grpSp>
               <p:nvGrpSpPr>
-                <p:cNvPr id="20" name="Group 19">
+                <p:cNvPr id="61" name="Group 60">
                   <a:extLst>
                     <a:ext uri="{FF2B5EF4-FFF2-40B4-BE49-F238E27FC236}">
-                      <a16:creationId xmlns:a16="http://schemas.microsoft.com/office/drawing/2014/main" id="{3FD7FDF6-0900-8848-AEF4-A56DE82B6BB3}"/>
+                      <a16:creationId xmlns:a16="http://schemas.microsoft.com/office/drawing/2014/main" id="{28833A83-7B5A-B545-9E5A-0512807D9FE7}"/>
                     </a:ext>
                   </a:extLst>
                 </p:cNvPr>
@@ -4435,10 +4439,10 @@
               </p:grpSpPr>
               <p:sp>
                 <p:nvSpPr>
-                  <p:cNvPr id="21" name="Oval 20">
+                  <p:cNvPr id="62" name="Oval 61">
                     <a:extLst>
                       <a:ext uri="{FF2B5EF4-FFF2-40B4-BE49-F238E27FC236}">
-                        <a16:creationId xmlns:a16="http://schemas.microsoft.com/office/drawing/2014/main" id="{1594B7AB-E499-6F43-8106-F96449330C5E}"/>
+                        <a16:creationId xmlns:a16="http://schemas.microsoft.com/office/drawing/2014/main" id="{6D86AE3B-8E39-A147-B31E-2D6BF37AAC8A}"/>
                       </a:ext>
                     </a:extLst>
                   </p:cNvPr>
@@ -4492,10 +4496,10 @@
               </p:sp>
               <p:pic>
                 <p:nvPicPr>
-                  <p:cNvPr id="22" name="Graphic 21" descr="Mitochondria with solid fill">
+                  <p:cNvPr id="63" name="Graphic 62" descr="Mitochondria with solid fill">
                     <a:extLst>
                       <a:ext uri="{FF2B5EF4-FFF2-40B4-BE49-F238E27FC236}">
-                        <a16:creationId xmlns:a16="http://schemas.microsoft.com/office/drawing/2014/main" id="{5045762F-00AB-5F4C-BA7F-E166DC6FC5BE}"/>
+                        <a16:creationId xmlns:a16="http://schemas.microsoft.com/office/drawing/2014/main" id="{5CEE1E7E-78D5-834C-BF57-A26DC74DFC69}"/>
                       </a:ext>
                     </a:extLst>
                   </p:cNvPr>
@@ -4528,10 +4532,10 @@
               </p:pic>
               <p:grpSp>
                 <p:nvGrpSpPr>
-                  <p:cNvPr id="23" name="Group 22">
+                  <p:cNvPr id="64" name="Group 63">
                     <a:extLst>
                       <a:ext uri="{FF2B5EF4-FFF2-40B4-BE49-F238E27FC236}">
-                        <a16:creationId xmlns:a16="http://schemas.microsoft.com/office/drawing/2014/main" id="{04D198EE-CFFE-464F-B9D8-886E6D3E70FF}"/>
+                        <a16:creationId xmlns:a16="http://schemas.microsoft.com/office/drawing/2014/main" id="{1A7BEADC-A238-6D45-831C-329419214DDA}"/>
                       </a:ext>
                     </a:extLst>
                   </p:cNvPr>
@@ -4548,10 +4552,10 @@
                 </p:grpSpPr>
                 <p:sp>
                   <p:nvSpPr>
-                    <p:cNvPr id="24" name="Rounded Rectangle 23">
+                    <p:cNvPr id="65" name="Rounded Rectangle 64">
                       <a:extLst>
                         <a:ext uri="{FF2B5EF4-FFF2-40B4-BE49-F238E27FC236}">
-                          <a16:creationId xmlns:a16="http://schemas.microsoft.com/office/drawing/2014/main" id="{A15CD588-C05B-724F-87A4-BBE2EA18AB1C}"/>
+                          <a16:creationId xmlns:a16="http://schemas.microsoft.com/office/drawing/2014/main" id="{3B63CAD1-F59F-1342-A0E3-4045220D3481}"/>
                         </a:ext>
                       </a:extLst>
                     </p:cNvPr>
@@ -4605,10 +4609,10 @@
                 </p:sp>
                 <p:sp>
                   <p:nvSpPr>
-                    <p:cNvPr id="25" name="Oval 24">
+                    <p:cNvPr id="66" name="Oval 65">
                       <a:extLst>
                         <a:ext uri="{FF2B5EF4-FFF2-40B4-BE49-F238E27FC236}">
-                          <a16:creationId xmlns:a16="http://schemas.microsoft.com/office/drawing/2014/main" id="{FBA1D091-3479-C14B-9033-9004F9259C77}"/>
+                          <a16:creationId xmlns:a16="http://schemas.microsoft.com/office/drawing/2014/main" id="{D25AFFA5-F6B2-0F4C-8D69-54F6B10F810F}"/>
                         </a:ext>
                       </a:extLst>
                     </p:cNvPr>
@@ -4660,10 +4664,10 @@
           </p:grpSp>
           <p:grpSp>
             <p:nvGrpSpPr>
-              <p:cNvPr id="26" name="Group 25">
+              <p:cNvPr id="52" name="Group 51">
                 <a:extLst>
                   <a:ext uri="{FF2B5EF4-FFF2-40B4-BE49-F238E27FC236}">
-                    <a16:creationId xmlns:a16="http://schemas.microsoft.com/office/drawing/2014/main" id="{9817A1CB-DC04-8146-A6F7-066BD3BF8E31}"/>
+                    <a16:creationId xmlns:a16="http://schemas.microsoft.com/office/drawing/2014/main" id="{46327705-3017-B54E-991D-3906B6554CF4}"/>
                   </a:ext>
                 </a:extLst>
               </p:cNvPr>
@@ -4687,10 +4691,10 @@
             </p:grpSpPr>
             <p:sp>
               <p:nvSpPr>
-                <p:cNvPr id="27" name="Rectangle 26">
+                <p:cNvPr id="53" name="Rectangle 52">
                   <a:extLst>
                     <a:ext uri="{FF2B5EF4-FFF2-40B4-BE49-F238E27FC236}">
-                      <a16:creationId xmlns:a16="http://schemas.microsoft.com/office/drawing/2014/main" id="{090730EF-BB8F-7D48-BC4D-03D0C3338C64}"/>
+                      <a16:creationId xmlns:a16="http://schemas.microsoft.com/office/drawing/2014/main" id="{8D76F3A2-E4BF-3C42-9816-BE6F384CC65B}"/>
                     </a:ext>
                   </a:extLst>
                 </p:cNvPr>
@@ -4741,10 +4745,10 @@
             </p:sp>
             <p:grpSp>
               <p:nvGrpSpPr>
-                <p:cNvPr id="28" name="Group 27">
+                <p:cNvPr id="54" name="Group 53">
                   <a:extLst>
                     <a:ext uri="{FF2B5EF4-FFF2-40B4-BE49-F238E27FC236}">
-                      <a16:creationId xmlns:a16="http://schemas.microsoft.com/office/drawing/2014/main" id="{CEC173D8-FD6E-DB45-A273-80EF85EF11EF}"/>
+                      <a16:creationId xmlns:a16="http://schemas.microsoft.com/office/drawing/2014/main" id="{2E8F3059-4042-CD4C-A29F-CE38C88408C9}"/>
                     </a:ext>
                   </a:extLst>
                 </p:cNvPr>
@@ -4763,10 +4767,10 @@
               </p:grpSpPr>
               <p:sp>
                 <p:nvSpPr>
-                  <p:cNvPr id="29" name="Oval 28">
+                  <p:cNvPr id="55" name="Oval 54">
                     <a:extLst>
                       <a:ext uri="{FF2B5EF4-FFF2-40B4-BE49-F238E27FC236}">
-                        <a16:creationId xmlns:a16="http://schemas.microsoft.com/office/drawing/2014/main" id="{DA7A1538-7BC6-CA4A-A09B-25D0DE5F8C51}"/>
+                        <a16:creationId xmlns:a16="http://schemas.microsoft.com/office/drawing/2014/main" id="{9F45E294-B78D-4A4A-AC72-5A394F665787}"/>
                       </a:ext>
                     </a:extLst>
                   </p:cNvPr>
@@ -4820,10 +4824,10 @@
               </p:sp>
               <p:pic>
                 <p:nvPicPr>
-                  <p:cNvPr id="30" name="Graphic 29" descr="Mitochondria with solid fill">
+                  <p:cNvPr id="56" name="Graphic 55" descr="Mitochondria with solid fill">
                     <a:extLst>
                       <a:ext uri="{FF2B5EF4-FFF2-40B4-BE49-F238E27FC236}">
-                        <a16:creationId xmlns:a16="http://schemas.microsoft.com/office/drawing/2014/main" id="{82907139-C6FE-DA4D-85A0-959B0A68E5D0}"/>
+                        <a16:creationId xmlns:a16="http://schemas.microsoft.com/office/drawing/2014/main" id="{EB8C1748-CDC7-E149-AF41-3152417CA649}"/>
                       </a:ext>
                     </a:extLst>
                   </p:cNvPr>
@@ -4856,10 +4860,10 @@
               </p:pic>
               <p:grpSp>
                 <p:nvGrpSpPr>
-                  <p:cNvPr id="31" name="Group 30">
+                  <p:cNvPr id="57" name="Group 56">
                     <a:extLst>
                       <a:ext uri="{FF2B5EF4-FFF2-40B4-BE49-F238E27FC236}">
-                        <a16:creationId xmlns:a16="http://schemas.microsoft.com/office/drawing/2014/main" id="{61A53A59-7F36-B04C-8C49-E6645BC1EBD4}"/>
+                        <a16:creationId xmlns:a16="http://schemas.microsoft.com/office/drawing/2014/main" id="{51409FC2-1246-1144-838F-C0D8F1C842C3}"/>
                       </a:ext>
                     </a:extLst>
                   </p:cNvPr>
@@ -4876,10 +4880,10 @@
                 </p:grpSpPr>
                 <p:sp>
                   <p:nvSpPr>
-                    <p:cNvPr id="32" name="Rounded Rectangle 31">
+                    <p:cNvPr id="58" name="Rounded Rectangle 57">
                       <a:extLst>
                         <a:ext uri="{FF2B5EF4-FFF2-40B4-BE49-F238E27FC236}">
-                          <a16:creationId xmlns:a16="http://schemas.microsoft.com/office/drawing/2014/main" id="{7F8F7434-F57D-D244-A489-E343C81F49F7}"/>
+                          <a16:creationId xmlns:a16="http://schemas.microsoft.com/office/drawing/2014/main" id="{221C23FF-C8B2-9045-884C-667CD606615F}"/>
                         </a:ext>
                       </a:extLst>
                     </p:cNvPr>
@@ -4933,10 +4937,10 @@
                 </p:sp>
                 <p:sp>
                   <p:nvSpPr>
-                    <p:cNvPr id="33" name="Oval 32">
+                    <p:cNvPr id="59" name="Oval 58">
                       <a:extLst>
                         <a:ext uri="{FF2B5EF4-FFF2-40B4-BE49-F238E27FC236}">
-                          <a16:creationId xmlns:a16="http://schemas.microsoft.com/office/drawing/2014/main" id="{32DF83D8-0A36-6F4C-98DB-C68D67669A6F}"/>
+                          <a16:creationId xmlns:a16="http://schemas.microsoft.com/office/drawing/2014/main" id="{C001DDAC-BF6F-2B4F-99B6-3FD01462B220}"/>
                         </a:ext>
                       </a:extLst>
                     </p:cNvPr>
@@ -4989,10 +4993,10 @@
         </p:grpSp>
         <p:pic>
           <p:nvPicPr>
-            <p:cNvPr id="41" name="Graphic 40" descr="Open folder with solid fill">
+            <p:cNvPr id="20" name="Graphic 19" descr="Open folder with solid fill">
               <a:extLst>
                 <a:ext uri="{FF2B5EF4-FFF2-40B4-BE49-F238E27FC236}">
-                  <a16:creationId xmlns:a16="http://schemas.microsoft.com/office/drawing/2014/main" id="{8B6A114D-14B8-1C41-B891-49403D53AC0D}"/>
+                  <a16:creationId xmlns:a16="http://schemas.microsoft.com/office/drawing/2014/main" id="{BFADDEE2-10C7-A547-B3D1-9E5B5B8E6501}"/>
                 </a:ext>
               </a:extLst>
             </p:cNvPr>
@@ -5025,10 +5029,10 @@
         </p:pic>
         <p:pic>
           <p:nvPicPr>
-            <p:cNvPr id="43" name="Graphic 42" descr="Open folder with solid fill">
+            <p:cNvPr id="21" name="Graphic 20" descr="Open folder with solid fill">
               <a:extLst>
                 <a:ext uri="{FF2B5EF4-FFF2-40B4-BE49-F238E27FC236}">
-                  <a16:creationId xmlns:a16="http://schemas.microsoft.com/office/drawing/2014/main" id="{D2DCF8D1-1D25-F547-9FED-756FFF95073B}"/>
+                  <a16:creationId xmlns:a16="http://schemas.microsoft.com/office/drawing/2014/main" id="{5D24D5CB-9E31-1E40-9115-B0D122D622FE}"/>
                 </a:ext>
               </a:extLst>
             </p:cNvPr>
@@ -5061,10 +5065,10 @@
         </p:pic>
         <p:grpSp>
           <p:nvGrpSpPr>
-            <p:cNvPr id="106" name="Group 105">
+            <p:cNvPr id="22" name="Group 21">
               <a:extLst>
                 <a:ext uri="{FF2B5EF4-FFF2-40B4-BE49-F238E27FC236}">
-                  <a16:creationId xmlns:a16="http://schemas.microsoft.com/office/drawing/2014/main" id="{4082B5A5-5412-F049-96C1-FF6C542694FA}"/>
+                  <a16:creationId xmlns:a16="http://schemas.microsoft.com/office/drawing/2014/main" id="{6701A191-1480-5B43-AD28-5E5879611148}"/>
                 </a:ext>
               </a:extLst>
             </p:cNvPr>
@@ -5083,10 +5087,10 @@
           </p:grpSpPr>
           <p:grpSp>
             <p:nvGrpSpPr>
-              <p:cNvPr id="107" name="Group 106">
+              <p:cNvPr id="26" name="Group 25">
                 <a:extLst>
                   <a:ext uri="{FF2B5EF4-FFF2-40B4-BE49-F238E27FC236}">
-                    <a16:creationId xmlns:a16="http://schemas.microsoft.com/office/drawing/2014/main" id="{2D4804AE-90E4-BA42-9EF4-FA06323C387E}"/>
+                    <a16:creationId xmlns:a16="http://schemas.microsoft.com/office/drawing/2014/main" id="{70E12F85-F632-A74B-93AE-CD82C780FC95}"/>
                   </a:ext>
                 </a:extLst>
               </p:cNvPr>
@@ -5110,10 +5114,10 @@
             </p:grpSpPr>
             <p:sp>
               <p:nvSpPr>
-                <p:cNvPr id="124" name="Rectangle 123">
+                <p:cNvPr id="43" name="Rectangle 42">
                   <a:extLst>
                     <a:ext uri="{FF2B5EF4-FFF2-40B4-BE49-F238E27FC236}">
-                      <a16:creationId xmlns:a16="http://schemas.microsoft.com/office/drawing/2014/main" id="{E234B36C-6C33-174F-AF97-D5F4FF1AC2FB}"/>
+                      <a16:creationId xmlns:a16="http://schemas.microsoft.com/office/drawing/2014/main" id="{4AC81ED0-02F0-924F-A5AF-57071ECAF947}"/>
                     </a:ext>
                   </a:extLst>
                 </p:cNvPr>
@@ -5164,10 +5168,10 @@
             </p:sp>
             <p:grpSp>
               <p:nvGrpSpPr>
-                <p:cNvPr id="125" name="Group 124">
+                <p:cNvPr id="44" name="Group 43">
                   <a:extLst>
                     <a:ext uri="{FF2B5EF4-FFF2-40B4-BE49-F238E27FC236}">
-                      <a16:creationId xmlns:a16="http://schemas.microsoft.com/office/drawing/2014/main" id="{5F6262EF-1460-0C46-BBC8-C17FF9F87163}"/>
+                      <a16:creationId xmlns:a16="http://schemas.microsoft.com/office/drawing/2014/main" id="{EACF2F56-D8CE-E44A-BD15-A65DF398B895}"/>
                     </a:ext>
                   </a:extLst>
                 </p:cNvPr>
@@ -5186,10 +5190,10 @@
               </p:grpSpPr>
               <p:sp>
                 <p:nvSpPr>
-                  <p:cNvPr id="126" name="Oval 125">
+                  <p:cNvPr id="45" name="Oval 44">
                     <a:extLst>
                       <a:ext uri="{FF2B5EF4-FFF2-40B4-BE49-F238E27FC236}">
-                        <a16:creationId xmlns:a16="http://schemas.microsoft.com/office/drawing/2014/main" id="{B7F983C4-D68A-514B-B0A0-ABB0D8DB8284}"/>
+                        <a16:creationId xmlns:a16="http://schemas.microsoft.com/office/drawing/2014/main" id="{701606F1-D991-8548-8786-DE370A553219}"/>
                       </a:ext>
                     </a:extLst>
                   </p:cNvPr>
@@ -5243,10 +5247,10 @@
               </p:sp>
               <p:pic>
                 <p:nvPicPr>
-                  <p:cNvPr id="127" name="Graphic 126" descr="Mitochondria with solid fill">
+                  <p:cNvPr id="46" name="Graphic 45" descr="Mitochondria with solid fill">
                     <a:extLst>
                       <a:ext uri="{FF2B5EF4-FFF2-40B4-BE49-F238E27FC236}">
-                        <a16:creationId xmlns:a16="http://schemas.microsoft.com/office/drawing/2014/main" id="{6C09F7B1-4EB5-D341-80C3-5E27C9846A48}"/>
+                        <a16:creationId xmlns:a16="http://schemas.microsoft.com/office/drawing/2014/main" id="{B00972A5-E7C7-DE4C-A64A-A328732A7781}"/>
                       </a:ext>
                     </a:extLst>
                   </p:cNvPr>
@@ -5279,10 +5283,10 @@
               </p:pic>
               <p:grpSp>
                 <p:nvGrpSpPr>
-                  <p:cNvPr id="128" name="Group 127">
+                  <p:cNvPr id="47" name="Group 46">
                     <a:extLst>
                       <a:ext uri="{FF2B5EF4-FFF2-40B4-BE49-F238E27FC236}">
-                        <a16:creationId xmlns:a16="http://schemas.microsoft.com/office/drawing/2014/main" id="{0D55CDDE-2DE2-B54C-BFFA-AA9E92A4DB25}"/>
+                        <a16:creationId xmlns:a16="http://schemas.microsoft.com/office/drawing/2014/main" id="{0453EF76-B101-7543-BC8D-0B51864A5DD4}"/>
                       </a:ext>
                     </a:extLst>
                   </p:cNvPr>
@@ -5299,10 +5303,10 @@
                 </p:grpSpPr>
                 <p:sp>
                   <p:nvSpPr>
-                    <p:cNvPr id="129" name="Rounded Rectangle 128">
+                    <p:cNvPr id="48" name="Rounded Rectangle 47">
                       <a:extLst>
                         <a:ext uri="{FF2B5EF4-FFF2-40B4-BE49-F238E27FC236}">
-                          <a16:creationId xmlns:a16="http://schemas.microsoft.com/office/drawing/2014/main" id="{07562605-4141-C944-8DC5-5FF28AB3770D}"/>
+                          <a16:creationId xmlns:a16="http://schemas.microsoft.com/office/drawing/2014/main" id="{DC106D65-24BD-1E46-9E2E-ED217348188C}"/>
                         </a:ext>
                       </a:extLst>
                     </p:cNvPr>
@@ -5356,10 +5360,10 @@
                 </p:sp>
                 <p:sp>
                   <p:nvSpPr>
-                    <p:cNvPr id="130" name="Oval 129">
+                    <p:cNvPr id="49" name="Oval 48">
                       <a:extLst>
                         <a:ext uri="{FF2B5EF4-FFF2-40B4-BE49-F238E27FC236}">
-                          <a16:creationId xmlns:a16="http://schemas.microsoft.com/office/drawing/2014/main" id="{A8A20B95-1929-244D-A115-8AF6528E83FD}"/>
+                          <a16:creationId xmlns:a16="http://schemas.microsoft.com/office/drawing/2014/main" id="{11955121-BDD2-5B41-8277-57103DE93223}"/>
                         </a:ext>
                       </a:extLst>
                     </p:cNvPr>
@@ -5411,10 +5415,10 @@
           </p:grpSp>
           <p:grpSp>
             <p:nvGrpSpPr>
-              <p:cNvPr id="108" name="Group 107">
+              <p:cNvPr id="27" name="Group 26">
                 <a:extLst>
                   <a:ext uri="{FF2B5EF4-FFF2-40B4-BE49-F238E27FC236}">
-                    <a16:creationId xmlns:a16="http://schemas.microsoft.com/office/drawing/2014/main" id="{8BA25EE0-6B1F-3E40-B023-06316A46BD39}"/>
+                    <a16:creationId xmlns:a16="http://schemas.microsoft.com/office/drawing/2014/main" id="{FD7CB1E6-E471-AF4B-A261-AA72734F9BF8}"/>
                   </a:ext>
                 </a:extLst>
               </p:cNvPr>
@@ -5438,10 +5442,10 @@
             </p:grpSpPr>
             <p:sp>
               <p:nvSpPr>
-                <p:cNvPr id="117" name="Rectangle 116">
+                <p:cNvPr id="36" name="Rectangle 35">
                   <a:extLst>
                     <a:ext uri="{FF2B5EF4-FFF2-40B4-BE49-F238E27FC236}">
-                      <a16:creationId xmlns:a16="http://schemas.microsoft.com/office/drawing/2014/main" id="{2CF72338-BC61-824D-94A9-13ECE7FFA94A}"/>
+                      <a16:creationId xmlns:a16="http://schemas.microsoft.com/office/drawing/2014/main" id="{2B75A8E2-AE21-ED48-93B3-8C367A371C7E}"/>
                     </a:ext>
                   </a:extLst>
                 </p:cNvPr>
@@ -5492,10 +5496,10 @@
             </p:sp>
             <p:grpSp>
               <p:nvGrpSpPr>
-                <p:cNvPr id="118" name="Group 117">
+                <p:cNvPr id="37" name="Group 36">
                   <a:extLst>
                     <a:ext uri="{FF2B5EF4-FFF2-40B4-BE49-F238E27FC236}">
-                      <a16:creationId xmlns:a16="http://schemas.microsoft.com/office/drawing/2014/main" id="{59336709-E2F6-0746-B6FB-009DDF76B6BA}"/>
+                      <a16:creationId xmlns:a16="http://schemas.microsoft.com/office/drawing/2014/main" id="{302E679D-40DD-0C47-897A-FC237FBAE543}"/>
                     </a:ext>
                   </a:extLst>
                 </p:cNvPr>
@@ -5514,10 +5518,10 @@
               </p:grpSpPr>
               <p:sp>
                 <p:nvSpPr>
-                  <p:cNvPr id="119" name="Oval 118">
+                  <p:cNvPr id="38" name="Oval 37">
                     <a:extLst>
                       <a:ext uri="{FF2B5EF4-FFF2-40B4-BE49-F238E27FC236}">
-                        <a16:creationId xmlns:a16="http://schemas.microsoft.com/office/drawing/2014/main" id="{6DFA3F07-54E7-8545-ABFE-3CB8A961FD20}"/>
+                        <a16:creationId xmlns:a16="http://schemas.microsoft.com/office/drawing/2014/main" id="{0A00CE8F-6D40-0F49-9570-510938AF95B8}"/>
                       </a:ext>
                     </a:extLst>
                   </p:cNvPr>
@@ -5571,10 +5575,10 @@
               </p:sp>
               <p:pic>
                 <p:nvPicPr>
-                  <p:cNvPr id="120" name="Graphic 119" descr="Mitochondria with solid fill">
+                  <p:cNvPr id="39" name="Graphic 38" descr="Mitochondria with solid fill">
                     <a:extLst>
                       <a:ext uri="{FF2B5EF4-FFF2-40B4-BE49-F238E27FC236}">
-                        <a16:creationId xmlns:a16="http://schemas.microsoft.com/office/drawing/2014/main" id="{CB36A649-199D-6444-B312-CE6A7C4152BE}"/>
+                        <a16:creationId xmlns:a16="http://schemas.microsoft.com/office/drawing/2014/main" id="{0A68DD85-D6B8-5E4C-9E92-16813B3A1BED}"/>
                       </a:ext>
                     </a:extLst>
                   </p:cNvPr>
@@ -5607,10 +5611,10 @@
               </p:pic>
               <p:grpSp>
                 <p:nvGrpSpPr>
-                  <p:cNvPr id="121" name="Group 120">
+                  <p:cNvPr id="40" name="Group 39">
                     <a:extLst>
                       <a:ext uri="{FF2B5EF4-FFF2-40B4-BE49-F238E27FC236}">
-                        <a16:creationId xmlns:a16="http://schemas.microsoft.com/office/drawing/2014/main" id="{39EBD285-13FF-774E-8B47-C2ACEB285BD7}"/>
+                        <a16:creationId xmlns:a16="http://schemas.microsoft.com/office/drawing/2014/main" id="{F6FDBDC6-99FB-0643-9684-2A7F14258D04}"/>
                       </a:ext>
                     </a:extLst>
                   </p:cNvPr>
@@ -5627,10 +5631,10 @@
                 </p:grpSpPr>
                 <p:sp>
                   <p:nvSpPr>
-                    <p:cNvPr id="122" name="Rounded Rectangle 121">
+                    <p:cNvPr id="41" name="Rounded Rectangle 40">
                       <a:extLst>
                         <a:ext uri="{FF2B5EF4-FFF2-40B4-BE49-F238E27FC236}">
-                          <a16:creationId xmlns:a16="http://schemas.microsoft.com/office/drawing/2014/main" id="{CAD6C9F3-57D0-514C-83DD-F61A220F3AFD}"/>
+                          <a16:creationId xmlns:a16="http://schemas.microsoft.com/office/drawing/2014/main" id="{91FFD3AF-7888-C041-A2D5-606D568A794F}"/>
                         </a:ext>
                       </a:extLst>
                     </p:cNvPr>
@@ -5684,10 +5688,10 @@
                 </p:sp>
                 <p:sp>
                   <p:nvSpPr>
-                    <p:cNvPr id="123" name="Oval 122">
+                    <p:cNvPr id="42" name="Oval 41">
                       <a:extLst>
                         <a:ext uri="{FF2B5EF4-FFF2-40B4-BE49-F238E27FC236}">
-                          <a16:creationId xmlns:a16="http://schemas.microsoft.com/office/drawing/2014/main" id="{1A147FF2-474A-DD4F-8B49-7E6E0CA73EC8}"/>
+                          <a16:creationId xmlns:a16="http://schemas.microsoft.com/office/drawing/2014/main" id="{150C91A3-7B0F-394E-AFB8-A1F24AEB17C1}"/>
                         </a:ext>
                       </a:extLst>
                     </p:cNvPr>
@@ -5739,10 +5743,10 @@
           </p:grpSp>
           <p:grpSp>
             <p:nvGrpSpPr>
-              <p:cNvPr id="109" name="Group 108">
+              <p:cNvPr id="28" name="Group 27">
                 <a:extLst>
                   <a:ext uri="{FF2B5EF4-FFF2-40B4-BE49-F238E27FC236}">
-                    <a16:creationId xmlns:a16="http://schemas.microsoft.com/office/drawing/2014/main" id="{6846D524-A69D-0047-AAB1-E9BA4EFE3863}"/>
+                    <a16:creationId xmlns:a16="http://schemas.microsoft.com/office/drawing/2014/main" id="{627E24DD-1B0B-AF40-A04F-D2781E049053}"/>
                   </a:ext>
                 </a:extLst>
               </p:cNvPr>
@@ -5766,10 +5770,10 @@
             </p:grpSpPr>
             <p:sp>
               <p:nvSpPr>
-                <p:cNvPr id="110" name="Rectangle 109">
+                <p:cNvPr id="29" name="Rectangle 28">
                   <a:extLst>
                     <a:ext uri="{FF2B5EF4-FFF2-40B4-BE49-F238E27FC236}">
-                      <a16:creationId xmlns:a16="http://schemas.microsoft.com/office/drawing/2014/main" id="{AC0374DE-9BE9-B543-8FCB-63BC5D528FA9}"/>
+                      <a16:creationId xmlns:a16="http://schemas.microsoft.com/office/drawing/2014/main" id="{1C131193-5C27-FC41-901E-AB2DAD6D21C3}"/>
                     </a:ext>
                   </a:extLst>
                 </p:cNvPr>
@@ -5820,10 +5824,10 @@
             </p:sp>
             <p:grpSp>
               <p:nvGrpSpPr>
-                <p:cNvPr id="111" name="Group 110">
+                <p:cNvPr id="30" name="Group 29">
                   <a:extLst>
                     <a:ext uri="{FF2B5EF4-FFF2-40B4-BE49-F238E27FC236}">
-                      <a16:creationId xmlns:a16="http://schemas.microsoft.com/office/drawing/2014/main" id="{80F9ECAE-7CA1-4C40-8FB3-7D25F80094B2}"/>
+                      <a16:creationId xmlns:a16="http://schemas.microsoft.com/office/drawing/2014/main" id="{90803E5A-2723-5F4E-9947-79B34F157E13}"/>
                     </a:ext>
                   </a:extLst>
                 </p:cNvPr>
@@ -5842,10 +5846,10 @@
               </p:grpSpPr>
               <p:sp>
                 <p:nvSpPr>
-                  <p:cNvPr id="112" name="Oval 111">
+                  <p:cNvPr id="31" name="Oval 30">
                     <a:extLst>
                       <a:ext uri="{FF2B5EF4-FFF2-40B4-BE49-F238E27FC236}">
-                        <a16:creationId xmlns:a16="http://schemas.microsoft.com/office/drawing/2014/main" id="{81BE87FD-2F39-ED43-8EC8-4AD90AEB9308}"/>
+                        <a16:creationId xmlns:a16="http://schemas.microsoft.com/office/drawing/2014/main" id="{5F67612C-1FE4-6440-BCB5-0FCC61070A99}"/>
                       </a:ext>
                     </a:extLst>
                   </p:cNvPr>
@@ -5899,10 +5903,10 @@
               </p:sp>
               <p:pic>
                 <p:nvPicPr>
-                  <p:cNvPr id="113" name="Graphic 112" descr="Mitochondria with solid fill">
+                  <p:cNvPr id="32" name="Graphic 31" descr="Mitochondria with solid fill">
                     <a:extLst>
                       <a:ext uri="{FF2B5EF4-FFF2-40B4-BE49-F238E27FC236}">
-                        <a16:creationId xmlns:a16="http://schemas.microsoft.com/office/drawing/2014/main" id="{6DB8581B-A8C7-5F46-9ED6-BC033CA27D09}"/>
+                        <a16:creationId xmlns:a16="http://schemas.microsoft.com/office/drawing/2014/main" id="{0C53DE3B-3733-004A-AA9E-0F96B3C99AC0}"/>
                       </a:ext>
                     </a:extLst>
                   </p:cNvPr>
@@ -5935,10 +5939,10 @@
               </p:pic>
               <p:grpSp>
                 <p:nvGrpSpPr>
-                  <p:cNvPr id="114" name="Group 113">
+                  <p:cNvPr id="33" name="Group 32">
                     <a:extLst>
                       <a:ext uri="{FF2B5EF4-FFF2-40B4-BE49-F238E27FC236}">
-                        <a16:creationId xmlns:a16="http://schemas.microsoft.com/office/drawing/2014/main" id="{4B232C57-1C57-CB47-9859-0453983AA499}"/>
+                        <a16:creationId xmlns:a16="http://schemas.microsoft.com/office/drawing/2014/main" id="{8B5478CF-890B-D54C-A620-ED3963CBB337}"/>
                       </a:ext>
                     </a:extLst>
                   </p:cNvPr>
@@ -5955,10 +5959,10 @@
                 </p:grpSpPr>
                 <p:sp>
                   <p:nvSpPr>
-                    <p:cNvPr id="115" name="Rounded Rectangle 114">
+                    <p:cNvPr id="34" name="Rounded Rectangle 33">
                       <a:extLst>
                         <a:ext uri="{FF2B5EF4-FFF2-40B4-BE49-F238E27FC236}">
-                          <a16:creationId xmlns:a16="http://schemas.microsoft.com/office/drawing/2014/main" id="{74701305-D02E-3344-9605-8E4C28897FBB}"/>
+                          <a16:creationId xmlns:a16="http://schemas.microsoft.com/office/drawing/2014/main" id="{1FDFD469-DD6A-0049-99C7-560811A60C41}"/>
                         </a:ext>
                       </a:extLst>
                     </p:cNvPr>
@@ -6012,10 +6016,10 @@
                 </p:sp>
                 <p:sp>
                   <p:nvSpPr>
-                    <p:cNvPr id="116" name="Oval 115">
+                    <p:cNvPr id="35" name="Oval 34">
                       <a:extLst>
                         <a:ext uri="{FF2B5EF4-FFF2-40B4-BE49-F238E27FC236}">
-                          <a16:creationId xmlns:a16="http://schemas.microsoft.com/office/drawing/2014/main" id="{4218912B-8372-794A-A7C4-744DDAC41A93}"/>
+                          <a16:creationId xmlns:a16="http://schemas.microsoft.com/office/drawing/2014/main" id="{BC531D7D-13D8-584D-AAC6-54ACE7C1A57F}"/>
                         </a:ext>
                       </a:extLst>
                     </p:cNvPr>
@@ -6068,10 +6072,10 @@
         </p:grpSp>
         <p:cxnSp>
           <p:nvCxnSpPr>
-            <p:cNvPr id="131" name="Straight Arrow Connector 130">
+            <p:cNvPr id="23" name="Straight Arrow Connector 22">
               <a:extLst>
                 <a:ext uri="{FF2B5EF4-FFF2-40B4-BE49-F238E27FC236}">
-                  <a16:creationId xmlns:a16="http://schemas.microsoft.com/office/drawing/2014/main" id="{7EC7437E-6F0A-C949-B5B1-FA40CFBCD3C4}"/>
+                  <a16:creationId xmlns:a16="http://schemas.microsoft.com/office/drawing/2014/main" id="{46A8D1B4-7E54-344A-BA43-E70E84769E47}"/>
                 </a:ext>
               </a:extLst>
             </p:cNvPr>
@@ -6116,10 +6120,10 @@
         </p:cxnSp>
         <p:cxnSp>
           <p:nvCxnSpPr>
-            <p:cNvPr id="133" name="Straight Arrow Connector 132">
+            <p:cNvPr id="24" name="Straight Arrow Connector 23">
               <a:extLst>
                 <a:ext uri="{FF2B5EF4-FFF2-40B4-BE49-F238E27FC236}">
-                  <a16:creationId xmlns:a16="http://schemas.microsoft.com/office/drawing/2014/main" id="{78EF84B3-A603-E940-A57C-60CDA233B8B5}"/>
+                  <a16:creationId xmlns:a16="http://schemas.microsoft.com/office/drawing/2014/main" id="{089D50DE-47AD-6540-AA81-96EDE9AF4F3A}"/>
                 </a:ext>
               </a:extLst>
             </p:cNvPr>
@@ -6164,10 +6168,10 @@
         </p:cxnSp>
         <p:cxnSp>
           <p:nvCxnSpPr>
-            <p:cNvPr id="134" name="Straight Arrow Connector 133">
+            <p:cNvPr id="25" name="Straight Arrow Connector 24">
               <a:extLst>
                 <a:ext uri="{FF2B5EF4-FFF2-40B4-BE49-F238E27FC236}">
-                  <a16:creationId xmlns:a16="http://schemas.microsoft.com/office/drawing/2014/main" id="{18828F3D-5779-E34C-A914-18B5C283836B}"/>
+                  <a16:creationId xmlns:a16="http://schemas.microsoft.com/office/drawing/2014/main" id="{3E756D69-78A5-5844-A938-01820A99E4E9}"/>
                 </a:ext>
               </a:extLst>
             </p:cNvPr>
@@ -6213,10 +6217,10 @@
       </p:grpSp>
       <p:sp>
         <p:nvSpPr>
-          <p:cNvPr id="138" name="TextBox 137">
-            <a:extLst>
-              <a:ext uri="{FF2B5EF4-FFF2-40B4-BE49-F238E27FC236}">
-                <a16:creationId xmlns:a16="http://schemas.microsoft.com/office/drawing/2014/main" id="{4B1FED80-9F05-B84B-A50F-9D12F6E6BE40}"/>
+          <p:cNvPr id="74" name="TextBox 73">
+            <a:extLst>
+              <a:ext uri="{FF2B5EF4-FFF2-40B4-BE49-F238E27FC236}">
+                <a16:creationId xmlns:a16="http://schemas.microsoft.com/office/drawing/2014/main" id="{0F65FDF7-95FB-B645-AE7A-091EA929BE14}"/>
               </a:ext>
             </a:extLst>
           </p:cNvPr>
@@ -6225,7 +6229,7 @@
         </p:nvSpPr>
         <p:spPr>
           <a:xfrm>
-            <a:off x="6369105" y="1631100"/>
+            <a:off x="6677715" y="1631100"/>
             <a:ext cx="2020716" cy="276999"/>
           </a:xfrm>
           <a:prstGeom prst="rect">
@@ -6281,10 +6285,10 @@
       </p:sp>
       <p:cxnSp>
         <p:nvCxnSpPr>
-          <p:cNvPr id="141" name="Straight Arrow Connector 140">
-            <a:extLst>
-              <a:ext uri="{FF2B5EF4-FFF2-40B4-BE49-F238E27FC236}">
-                <a16:creationId xmlns:a16="http://schemas.microsoft.com/office/drawing/2014/main" id="{6231D62C-CC43-6F45-9813-B6B432980B7B}"/>
+          <p:cNvPr id="75" name="Straight Arrow Connector 74">
+            <a:extLst>
+              <a:ext uri="{FF2B5EF4-FFF2-40B4-BE49-F238E27FC236}">
+                <a16:creationId xmlns:a16="http://schemas.microsoft.com/office/drawing/2014/main" id="{DB0ADAA1-2724-1C42-87D9-434C303BEB57}"/>
               </a:ext>
             </a:extLst>
           </p:cNvPr>
@@ -6295,7 +6299,7 @@
         </p:nvCxnSpPr>
         <p:spPr>
           <a:xfrm flipV="1">
-            <a:off x="6303865" y="2167319"/>
+            <a:off x="6612475" y="2167319"/>
             <a:ext cx="2177983" cy="12745"/>
           </a:xfrm>
           <a:prstGeom prst="straightConnector1">
@@ -6329,10 +6333,10 @@
       </p:cxnSp>
       <p:sp>
         <p:nvSpPr>
-          <p:cNvPr id="146" name="TextBox 145">
-            <a:extLst>
-              <a:ext uri="{FF2B5EF4-FFF2-40B4-BE49-F238E27FC236}">
-                <a16:creationId xmlns:a16="http://schemas.microsoft.com/office/drawing/2014/main" id="{68E203F1-3EA2-DC44-9081-389CC70DFDF6}"/>
+          <p:cNvPr id="76" name="TextBox 75">
+            <a:extLst>
+              <a:ext uri="{FF2B5EF4-FFF2-40B4-BE49-F238E27FC236}">
+                <a16:creationId xmlns:a16="http://schemas.microsoft.com/office/drawing/2014/main" id="{2251E288-DEB2-274A-96C1-737F5D079A28}"/>
               </a:ext>
             </a:extLst>
           </p:cNvPr>
@@ -6341,7 +6345,7 @@
         </p:nvSpPr>
         <p:spPr>
           <a:xfrm>
-            <a:off x="6337575" y="2180894"/>
+            <a:off x="6646185" y="2180894"/>
             <a:ext cx="2094324" cy="276999"/>
           </a:xfrm>
           <a:prstGeom prst="rect">
@@ -6373,10 +6377,10 @@
       </p:sp>
       <p:cxnSp>
         <p:nvCxnSpPr>
-          <p:cNvPr id="151" name="Straight Arrow Connector 150">
-            <a:extLst>
-              <a:ext uri="{FF2B5EF4-FFF2-40B4-BE49-F238E27FC236}">
-                <a16:creationId xmlns:a16="http://schemas.microsoft.com/office/drawing/2014/main" id="{D64B5191-5A3F-DC4A-BB2B-EA574BCB283D}"/>
+          <p:cNvPr id="77" name="Straight Arrow Connector 76">
+            <a:extLst>
+              <a:ext uri="{FF2B5EF4-FFF2-40B4-BE49-F238E27FC236}">
+                <a16:creationId xmlns:a16="http://schemas.microsoft.com/office/drawing/2014/main" id="{08E0275B-869E-2C4B-B37A-76F27CA41B90}"/>
               </a:ext>
             </a:extLst>
           </p:cNvPr>
@@ -6387,7 +6391,7 @@
         </p:nvCxnSpPr>
         <p:spPr>
           <a:xfrm>
-            <a:off x="9073777" y="3022452"/>
+            <a:off x="9728344" y="2921066"/>
             <a:ext cx="1" cy="641033"/>
           </a:xfrm>
           <a:prstGeom prst="straightConnector1">
@@ -6421,10 +6425,10 @@
       </p:cxnSp>
       <p:sp>
         <p:nvSpPr>
-          <p:cNvPr id="154" name="TextBox 153">
-            <a:extLst>
-              <a:ext uri="{FF2B5EF4-FFF2-40B4-BE49-F238E27FC236}">
-                <a16:creationId xmlns:a16="http://schemas.microsoft.com/office/drawing/2014/main" id="{63F4D837-6B3B-3F49-9F3A-94E4EBE16662}"/>
+          <p:cNvPr id="78" name="TextBox 77">
+            <a:extLst>
+              <a:ext uri="{FF2B5EF4-FFF2-40B4-BE49-F238E27FC236}">
+                <a16:creationId xmlns:a16="http://schemas.microsoft.com/office/drawing/2014/main" id="{1084E3B2-6094-0C46-AAAD-AAB988340136}"/>
               </a:ext>
             </a:extLst>
           </p:cNvPr>
@@ -6464,22 +6468,22 @@
       </p:sp>
       <p:cxnSp>
         <p:nvCxnSpPr>
-          <p:cNvPr id="155" name="Straight Arrow Connector 154">
-            <a:extLst>
-              <a:ext uri="{FF2B5EF4-FFF2-40B4-BE49-F238E27FC236}">
-                <a16:creationId xmlns:a16="http://schemas.microsoft.com/office/drawing/2014/main" id="{A04191A9-505B-4140-B10E-2D8DDDA12342}"/>
+          <p:cNvPr id="79" name="Straight Arrow Connector 78">
+            <a:extLst>
+              <a:ext uri="{FF2B5EF4-FFF2-40B4-BE49-F238E27FC236}">
+                <a16:creationId xmlns:a16="http://schemas.microsoft.com/office/drawing/2014/main" id="{8AA25228-07C6-E641-BF55-D09FE6F09470}"/>
               </a:ext>
             </a:extLst>
           </p:cNvPr>
           <p:cNvCxnSpPr>
             <a:cxnSpLocks/>
-            <a:stCxn id="1026" idx="1"/>
+            <a:stCxn id="12" idx="1"/>
           </p:cNvCxnSpPr>
           <p:nvPr/>
         </p:nvCxnSpPr>
         <p:spPr>
           <a:xfrm flipH="1">
-            <a:off x="6197238" y="4207330"/>
+            <a:off x="6195424" y="3982658"/>
             <a:ext cx="1380919" cy="0"/>
           </a:xfrm>
           <a:prstGeom prst="straightConnector1">
@@ -6513,10 +6517,10 @@
       </p:cxnSp>
       <p:pic>
         <p:nvPicPr>
-          <p:cNvPr id="156" name="Graphic 155" descr="Open folder with solid fill">
-            <a:extLst>
-              <a:ext uri="{FF2B5EF4-FFF2-40B4-BE49-F238E27FC236}">
-                <a16:creationId xmlns:a16="http://schemas.microsoft.com/office/drawing/2014/main" id="{A383187C-C36D-AD49-8A4D-7C9D3B3AF93F}"/>
+          <p:cNvPr id="80" name="Graphic 79" descr="Open folder with solid fill">
+            <a:extLst>
+              <a:ext uri="{FF2B5EF4-FFF2-40B4-BE49-F238E27FC236}">
+                <a16:creationId xmlns:a16="http://schemas.microsoft.com/office/drawing/2014/main" id="{91EBE995-7823-6840-9393-C69500F0DDF3}"/>
               </a:ext>
             </a:extLst>
           </p:cNvPr>
@@ -6549,10 +6553,10 @@
       </p:pic>
       <p:pic>
         <p:nvPicPr>
-          <p:cNvPr id="1041" name="Graphic 1040" descr="Document with solid fill">
-            <a:extLst>
-              <a:ext uri="{FF2B5EF4-FFF2-40B4-BE49-F238E27FC236}">
-                <a16:creationId xmlns:a16="http://schemas.microsoft.com/office/drawing/2014/main" id="{93DAD1C4-ACD5-4A4E-ABD5-3F686C1CF293}"/>
+          <p:cNvPr id="81" name="Graphic 80" descr="Document with solid fill">
+            <a:extLst>
+              <a:ext uri="{FF2B5EF4-FFF2-40B4-BE49-F238E27FC236}">
+                <a16:creationId xmlns:a16="http://schemas.microsoft.com/office/drawing/2014/main" id="{2868A919-FDEF-774A-A317-25CBCE195604}"/>
               </a:ext>
             </a:extLst>
           </p:cNvPr>
@@ -6585,10 +6589,10 @@
       </p:pic>
       <p:pic>
         <p:nvPicPr>
-          <p:cNvPr id="1045" name="Graphic 1044" descr="Table with solid fill">
-            <a:extLst>
-              <a:ext uri="{FF2B5EF4-FFF2-40B4-BE49-F238E27FC236}">
-                <a16:creationId xmlns:a16="http://schemas.microsoft.com/office/drawing/2014/main" id="{C665045B-0B15-0841-8E8F-8A3D3CCAEE40}"/>
+          <p:cNvPr id="82" name="Graphic 81" descr="Table with solid fill">
+            <a:extLst>
+              <a:ext uri="{FF2B5EF4-FFF2-40B4-BE49-F238E27FC236}">
+                <a16:creationId xmlns:a16="http://schemas.microsoft.com/office/drawing/2014/main" id="{B6F9ED36-55F8-1A4A-B48D-D070D8D118B1}"/>
               </a:ext>
             </a:extLst>
           </p:cNvPr>
@@ -6621,10 +6625,10 @@
       </p:pic>
       <p:sp>
         <p:nvSpPr>
-          <p:cNvPr id="165" name="TextBox 164">
-            <a:extLst>
-              <a:ext uri="{FF2B5EF4-FFF2-40B4-BE49-F238E27FC236}">
-                <a16:creationId xmlns:a16="http://schemas.microsoft.com/office/drawing/2014/main" id="{38FE0CB5-33C0-CB42-BDEB-3066525DD8CF}"/>
+          <p:cNvPr id="83" name="TextBox 82">
+            <a:extLst>
+              <a:ext uri="{FF2B5EF4-FFF2-40B4-BE49-F238E27FC236}">
+                <a16:creationId xmlns:a16="http://schemas.microsoft.com/office/drawing/2014/main" id="{3E915D7A-72EC-8A4A-872D-6FF951099838}"/>
               </a:ext>
             </a:extLst>
           </p:cNvPr>
@@ -6665,10 +6669,10 @@
       </p:sp>
       <p:sp>
         <p:nvSpPr>
-          <p:cNvPr id="166" name="TextBox 165">
-            <a:extLst>
-              <a:ext uri="{FF2B5EF4-FFF2-40B4-BE49-F238E27FC236}">
-                <a16:creationId xmlns:a16="http://schemas.microsoft.com/office/drawing/2014/main" id="{80D7041D-4545-3947-9C2D-FF088EAE777D}"/>
+          <p:cNvPr id="84" name="TextBox 83">
+            <a:extLst>
+              <a:ext uri="{FF2B5EF4-FFF2-40B4-BE49-F238E27FC236}">
+                <a16:creationId xmlns:a16="http://schemas.microsoft.com/office/drawing/2014/main" id="{6E603CE6-59FA-7344-9969-1C48DF503835}"/>
               </a:ext>
             </a:extLst>
           </p:cNvPr>
@@ -6709,10 +6713,10 @@
       </p:sp>
       <p:sp>
         <p:nvSpPr>
-          <p:cNvPr id="167" name="TextBox 166">
-            <a:extLst>
-              <a:ext uri="{FF2B5EF4-FFF2-40B4-BE49-F238E27FC236}">
-                <a16:creationId xmlns:a16="http://schemas.microsoft.com/office/drawing/2014/main" id="{154F74E6-0F27-5C4F-B917-84076CE55A00}"/>
+          <p:cNvPr id="85" name="TextBox 84">
+            <a:extLst>
+              <a:ext uri="{FF2B5EF4-FFF2-40B4-BE49-F238E27FC236}">
+                <a16:creationId xmlns:a16="http://schemas.microsoft.com/office/drawing/2014/main" id="{2BA1EA95-F44A-3646-9A23-46264957D7C8}"/>
               </a:ext>
             </a:extLst>
           </p:cNvPr>
@@ -6750,16 +6754,16 @@
       </p:sp>
       <p:cxnSp>
         <p:nvCxnSpPr>
-          <p:cNvPr id="168" name="Straight Arrow Connector 167">
-            <a:extLst>
-              <a:ext uri="{FF2B5EF4-FFF2-40B4-BE49-F238E27FC236}">
-                <a16:creationId xmlns:a16="http://schemas.microsoft.com/office/drawing/2014/main" id="{5DF78A96-26A7-8A44-8ABD-2B109C9203FB}"/>
+          <p:cNvPr id="86" name="Straight Arrow Connector 85">
+            <a:extLst>
+              <a:ext uri="{FF2B5EF4-FFF2-40B4-BE49-F238E27FC236}">
+                <a16:creationId xmlns:a16="http://schemas.microsoft.com/office/drawing/2014/main" id="{7C029C74-4042-6144-834E-D8CA2B581A35}"/>
               </a:ext>
             </a:extLst>
           </p:cNvPr>
           <p:cNvCxnSpPr>
             <a:cxnSpLocks/>
-            <a:endCxn id="44" idx="2"/>
+            <a:endCxn id="3" idx="2"/>
           </p:cNvCxnSpPr>
           <p:nvPr/>
         </p:nvCxnSpPr>
@@ -6797,70 +6801,12 @@
           </a:fontRef>
         </p:style>
       </p:cxnSp>
-      <p:sp>
-        <p:nvSpPr>
-          <p:cNvPr id="172" name="TextBox 171">
-            <a:extLst>
-              <a:ext uri="{FF2B5EF4-FFF2-40B4-BE49-F238E27FC236}">
-                <a16:creationId xmlns:a16="http://schemas.microsoft.com/office/drawing/2014/main" id="{F3299D7A-EBA4-7E4C-AE51-8138EF765F5B}"/>
-              </a:ext>
-            </a:extLst>
-          </p:cNvPr>
-          <p:cNvSpPr txBox="1"/>
-          <p:nvPr/>
-        </p:nvSpPr>
-        <p:spPr>
-          <a:xfrm>
-            <a:off x="8162722" y="4611264"/>
-            <a:ext cx="1642025" cy="461665"/>
-          </a:xfrm>
-          <a:prstGeom prst="rect">
-            <a:avLst/>
-          </a:prstGeom>
-          <a:solidFill>
-            <a:schemeClr val="bg2"/>
-          </a:solidFill>
-          <a:ln>
-            <a:solidFill>
-              <a:schemeClr val="tx1">
-                <a:lumMod val="95000"/>
-                <a:lumOff val="5000"/>
-              </a:schemeClr>
-            </a:solidFill>
-          </a:ln>
-          <a:effectLst>
-            <a:outerShdw blurRad="63500" sx="102000" sy="102000" algn="ctr" rotWithShape="0">
-              <a:prstClr val="black">
-                <a:alpha val="40000"/>
-              </a:prstClr>
-            </a:outerShdw>
-          </a:effectLst>
-        </p:spPr>
-        <p:txBody>
-          <a:bodyPr wrap="square">
-            <a:spAutoFit/>
-          </a:bodyPr>
-          <a:lstStyle/>
-          <a:p>
-            <a:pPr algn="ctr"/>
-            <a:r>
-              <a:rPr lang="en-US" sz="1200" dirty="0">
-                <a:solidFill>
-                  <a:srgbClr val="0070C0"/>
-                </a:solidFill>
-                <a:latin typeface=""/>
-              </a:rPr>
-              <a:t> additional automation codes</a:t>
-            </a:r>
-          </a:p>
-        </p:txBody>
-      </p:sp>
       <p:pic>
         <p:nvPicPr>
-          <p:cNvPr id="1050" name="Graphic 1049" descr="Add with solid fill">
-            <a:extLst>
-              <a:ext uri="{FF2B5EF4-FFF2-40B4-BE49-F238E27FC236}">
-                <a16:creationId xmlns:a16="http://schemas.microsoft.com/office/drawing/2014/main" id="{089BEC5C-FE20-614A-90A7-0CDE0869B557}"/>
+          <p:cNvPr id="88" name="Graphic 87" descr="Add with solid fill">
+            <a:extLst>
+              <a:ext uri="{FF2B5EF4-FFF2-40B4-BE49-F238E27FC236}">
+                <a16:creationId xmlns:a16="http://schemas.microsoft.com/office/drawing/2014/main" id="{A7A019A9-4A10-7D46-80B2-B671E1A6EE37}"/>
               </a:ext>
             </a:extLst>
           </p:cNvPr>
@@ -6883,7 +6829,7 @@
         </p:blipFill>
         <p:spPr>
           <a:xfrm>
-            <a:off x="8836180" y="4113442"/>
+            <a:off x="8881691" y="3851196"/>
             <a:ext cx="308815" cy="308815"/>
           </a:xfrm>
           <a:prstGeom prst="rect">
@@ -6893,10 +6839,10 @@
       </p:pic>
       <p:sp>
         <p:nvSpPr>
-          <p:cNvPr id="178" name="TextBox 177">
-            <a:extLst>
-              <a:ext uri="{FF2B5EF4-FFF2-40B4-BE49-F238E27FC236}">
-                <a16:creationId xmlns:a16="http://schemas.microsoft.com/office/drawing/2014/main" id="{F2C71DC0-5055-5A4E-A7EA-E6D008EB5F91}"/>
+          <p:cNvPr id="89" name="TextBox 88">
+            <a:extLst>
+              <a:ext uri="{FF2B5EF4-FFF2-40B4-BE49-F238E27FC236}">
+                <a16:creationId xmlns:a16="http://schemas.microsoft.com/office/drawing/2014/main" id="{5310A6FD-B6EC-7348-88AF-91D7FDBA08FB}"/>
               </a:ext>
             </a:extLst>
           </p:cNvPr>
@@ -6905,7 +6851,7 @@
         </p:nvSpPr>
         <p:spPr>
           <a:xfrm>
-            <a:off x="8706248" y="3163067"/>
+            <a:off x="9426296" y="3014731"/>
             <a:ext cx="2020716" cy="276999"/>
           </a:xfrm>
           <a:prstGeom prst="rect">
@@ -6937,10 +6883,10 @@
       </p:sp>
       <p:sp>
         <p:nvSpPr>
-          <p:cNvPr id="179" name="TextBox 178">
-            <a:extLst>
-              <a:ext uri="{FF2B5EF4-FFF2-40B4-BE49-F238E27FC236}">
-                <a16:creationId xmlns:a16="http://schemas.microsoft.com/office/drawing/2014/main" id="{B0918351-4A10-FA4A-A95F-C0B2621715B4}"/>
+          <p:cNvPr id="90" name="TextBox 89">
+            <a:extLst>
+              <a:ext uri="{FF2B5EF4-FFF2-40B4-BE49-F238E27FC236}">
+                <a16:creationId xmlns:a16="http://schemas.microsoft.com/office/drawing/2014/main" id="{17885FD7-FB5B-2047-A404-B5283B5E7346}"/>
               </a:ext>
             </a:extLst>
           </p:cNvPr>
@@ -6981,10 +6927,10 @@
       </p:sp>
       <p:pic>
         <p:nvPicPr>
-          <p:cNvPr id="2" name="Picture 2" descr="cellpose">
-            <a:extLst>
-              <a:ext uri="{FF2B5EF4-FFF2-40B4-BE49-F238E27FC236}">
-                <a16:creationId xmlns:a16="http://schemas.microsoft.com/office/drawing/2014/main" id="{A03EDA7E-F98B-9148-B5B3-65473F05471A}"/>
+          <p:cNvPr id="91" name="Picture 2" descr="cellpose">
+            <a:extLst>
+              <a:ext uri="{FF2B5EF4-FFF2-40B4-BE49-F238E27FC236}">
+                <a16:creationId xmlns:a16="http://schemas.microsoft.com/office/drawing/2014/main" id="{DA81D731-1B83-C541-91A3-89127A4AF9D5}"/>
               </a:ext>
             </a:extLst>
           </p:cNvPr>
@@ -7031,7 +6977,7 @@
           <p:cNvPr id="92" name="TextBox 91">
             <a:extLst>
               <a:ext uri="{FF2B5EF4-FFF2-40B4-BE49-F238E27FC236}">
-                <a16:creationId xmlns:a16="http://schemas.microsoft.com/office/drawing/2014/main" id="{4A1983C6-CB47-5645-9734-52509C25019D}"/>
+                <a16:creationId xmlns:a16="http://schemas.microsoft.com/office/drawing/2014/main" id="{F8964FEA-897F-F944-95DF-06F7353E499B}"/>
               </a:ext>
             </a:extLst>
           </p:cNvPr>
@@ -7072,10 +7018,76 @@
           </a:p>
         </p:txBody>
       </p:sp>
+      <p:pic>
+        <p:nvPicPr>
+          <p:cNvPr id="93" name="Picture 92">
+            <a:extLst>
+              <a:ext uri="{FF2B5EF4-FFF2-40B4-BE49-F238E27FC236}">
+                <a16:creationId xmlns:a16="http://schemas.microsoft.com/office/drawing/2014/main" id="{69A09C85-7E11-4241-B0AE-FBA0CC6A12C8}"/>
+              </a:ext>
+            </a:extLst>
+          </p:cNvPr>
+          <p:cNvPicPr>
+            <a:picLocks noChangeAspect="1"/>
+          </p:cNvPicPr>
+          <p:nvPr/>
+        </p:nvPicPr>
+        <p:blipFill>
+          <a:blip r:embed="rId25"/>
+          <a:stretch>
+            <a:fillRect/>
+          </a:stretch>
+        </p:blipFill>
+        <p:spPr>
+          <a:xfrm>
+            <a:off x="10610405" y="3373238"/>
+            <a:ext cx="1264729" cy="1264729"/>
+          </a:xfrm>
+          <a:prstGeom prst="rect">
+            <a:avLst/>
+          </a:prstGeom>
+        </p:spPr>
+      </p:pic>
+      <p:pic>
+        <p:nvPicPr>
+          <p:cNvPr id="94" name="Graphic 93" descr="Add with solid fill">
+            <a:extLst>
+              <a:ext uri="{FF2B5EF4-FFF2-40B4-BE49-F238E27FC236}">
+                <a16:creationId xmlns:a16="http://schemas.microsoft.com/office/drawing/2014/main" id="{D4CE3F79-FBB6-344A-BA25-289CD2C41515}"/>
+              </a:ext>
+            </a:extLst>
+          </p:cNvPr>
+          <p:cNvPicPr>
+            <a:picLocks noChangeAspect="1"/>
+          </p:cNvPicPr>
+          <p:nvPr/>
+        </p:nvPicPr>
+        <p:blipFill>
+          <a:blip r:embed="rId22">
+            <a:extLst>
+              <a:ext uri="{96DAC541-7B7A-43D3-8B79-37D633B846F1}">
+                <asvg:svgBlip xmlns:asvg="http://schemas.microsoft.com/office/drawing/2016/SVG/main" r:embed="rId23"/>
+              </a:ext>
+            </a:extLst>
+          </a:blip>
+          <a:stretch>
+            <a:fillRect/>
+          </a:stretch>
+        </p:blipFill>
+        <p:spPr>
+          <a:xfrm>
+            <a:off x="10282247" y="3828771"/>
+            <a:ext cx="308815" cy="308815"/>
+          </a:xfrm>
+          <a:prstGeom prst="rect">
+            <a:avLst/>
+          </a:prstGeom>
+        </p:spPr>
+      </p:pic>
     </p:spTree>
     <p:extLst>
       <p:ext uri="{BB962C8B-B14F-4D97-AF65-F5344CB8AC3E}">
-        <p14:creationId xmlns:p14="http://schemas.microsoft.com/office/powerpoint/2010/main" val="1799098406"/>
+        <p14:creationId xmlns:p14="http://schemas.microsoft.com/office/powerpoint/2010/main" val="1310559909"/>
       </p:ext>
     </p:extLst>
   </p:cSld>

</xml_diff>